<commit_message>
122 Explore Main Page
</commit_message>
<xml_diff>
--- a/GameMaster/GameDesign/UIDesign/探索.pptx
+++ b/GameMaster/GameDesign/UIDesign/探索.pptx
@@ -261,7 +261,7 @@
           <a:p>
             <a:fld id="{5DE7C53F-C427-478B-9026-7240F203DFAE}" type="datetimeFigureOut">
               <a:rPr lang="zh-CN" altLang="en-US" smtClean="0"/>
-              <a:t>2019/12/16/Monday</a:t>
+              <a:t>2019/12/17/Tuesday</a:t>
             </a:fld>
             <a:endParaRPr lang="zh-CN" altLang="en-US"/>
           </a:p>
@@ -459,7 +459,7 @@
           <a:p>
             <a:fld id="{5DE7C53F-C427-478B-9026-7240F203DFAE}" type="datetimeFigureOut">
               <a:rPr lang="zh-CN" altLang="en-US" smtClean="0"/>
-              <a:t>2019/12/16/Monday</a:t>
+              <a:t>2019/12/17/Tuesday</a:t>
             </a:fld>
             <a:endParaRPr lang="zh-CN" altLang="en-US"/>
           </a:p>
@@ -667,7 +667,7 @@
           <a:p>
             <a:fld id="{5DE7C53F-C427-478B-9026-7240F203DFAE}" type="datetimeFigureOut">
               <a:rPr lang="zh-CN" altLang="en-US" smtClean="0"/>
-              <a:t>2019/12/16/Monday</a:t>
+              <a:t>2019/12/17/Tuesday</a:t>
             </a:fld>
             <a:endParaRPr lang="zh-CN" altLang="en-US"/>
           </a:p>
@@ -865,7 +865,7 @@
           <a:p>
             <a:fld id="{5DE7C53F-C427-478B-9026-7240F203DFAE}" type="datetimeFigureOut">
               <a:rPr lang="zh-CN" altLang="en-US" smtClean="0"/>
-              <a:t>2019/12/16/Monday</a:t>
+              <a:t>2019/12/17/Tuesday</a:t>
             </a:fld>
             <a:endParaRPr lang="zh-CN" altLang="en-US"/>
           </a:p>
@@ -1140,7 +1140,7 @@
           <a:p>
             <a:fld id="{5DE7C53F-C427-478B-9026-7240F203DFAE}" type="datetimeFigureOut">
               <a:rPr lang="zh-CN" altLang="en-US" smtClean="0"/>
-              <a:t>2019/12/16/Monday</a:t>
+              <a:t>2019/12/17/Tuesday</a:t>
             </a:fld>
             <a:endParaRPr lang="zh-CN" altLang="en-US"/>
           </a:p>
@@ -1405,7 +1405,7 @@
           <a:p>
             <a:fld id="{5DE7C53F-C427-478B-9026-7240F203DFAE}" type="datetimeFigureOut">
               <a:rPr lang="zh-CN" altLang="en-US" smtClean="0"/>
-              <a:t>2019/12/16/Monday</a:t>
+              <a:t>2019/12/17/Tuesday</a:t>
             </a:fld>
             <a:endParaRPr lang="zh-CN" altLang="en-US"/>
           </a:p>
@@ -1817,7 +1817,7 @@
           <a:p>
             <a:fld id="{5DE7C53F-C427-478B-9026-7240F203DFAE}" type="datetimeFigureOut">
               <a:rPr lang="zh-CN" altLang="en-US" smtClean="0"/>
-              <a:t>2019/12/16/Monday</a:t>
+              <a:t>2019/12/17/Tuesday</a:t>
             </a:fld>
             <a:endParaRPr lang="zh-CN" altLang="en-US"/>
           </a:p>
@@ -1958,7 +1958,7 @@
           <a:p>
             <a:fld id="{5DE7C53F-C427-478B-9026-7240F203DFAE}" type="datetimeFigureOut">
               <a:rPr lang="zh-CN" altLang="en-US" smtClean="0"/>
-              <a:t>2019/12/16/Monday</a:t>
+              <a:t>2019/12/17/Tuesday</a:t>
             </a:fld>
             <a:endParaRPr lang="zh-CN" altLang="en-US"/>
           </a:p>
@@ -2071,7 +2071,7 @@
           <a:p>
             <a:fld id="{5DE7C53F-C427-478B-9026-7240F203DFAE}" type="datetimeFigureOut">
               <a:rPr lang="zh-CN" altLang="en-US" smtClean="0"/>
-              <a:t>2019/12/16/Monday</a:t>
+              <a:t>2019/12/17/Tuesday</a:t>
             </a:fld>
             <a:endParaRPr lang="zh-CN" altLang="en-US"/>
           </a:p>
@@ -2382,7 +2382,7 @@
           <a:p>
             <a:fld id="{5DE7C53F-C427-478B-9026-7240F203DFAE}" type="datetimeFigureOut">
               <a:rPr lang="zh-CN" altLang="en-US" smtClean="0"/>
-              <a:t>2019/12/16/Monday</a:t>
+              <a:t>2019/12/17/Tuesday</a:t>
             </a:fld>
             <a:endParaRPr lang="zh-CN" altLang="en-US"/>
           </a:p>
@@ -2670,7 +2670,7 @@
           <a:p>
             <a:fld id="{5DE7C53F-C427-478B-9026-7240F203DFAE}" type="datetimeFigureOut">
               <a:rPr lang="zh-CN" altLang="en-US" smtClean="0"/>
-              <a:t>2019/12/16/Monday</a:t>
+              <a:t>2019/12/17/Tuesday</a:t>
             </a:fld>
             <a:endParaRPr lang="zh-CN" altLang="en-US"/>
           </a:p>
@@ -2911,7 +2911,7 @@
           <a:p>
             <a:fld id="{5DE7C53F-C427-478B-9026-7240F203DFAE}" type="datetimeFigureOut">
               <a:rPr lang="zh-CN" altLang="en-US" smtClean="0"/>
-              <a:t>2019/12/16/Monday</a:t>
+              <a:t>2019/12/17/Tuesday</a:t>
             </a:fld>
             <a:endParaRPr lang="zh-CN" altLang="en-US"/>
           </a:p>
@@ -12733,10 +12733,10 @@
       </p:grpSp>
       <p:grpSp>
         <p:nvGrpSpPr>
-          <p:cNvPr id="1030" name="组合 1029">
+          <p:cNvPr id="187" name="组合 186">
             <a:extLst>
               <a:ext uri="{FF2B5EF4-FFF2-40B4-BE49-F238E27FC236}">
-                <a16:creationId xmlns:a16="http://schemas.microsoft.com/office/drawing/2014/main" id="{3E718789-D1D9-47CF-AB7C-6EBB9304A0BD}"/>
+                <a16:creationId xmlns:a16="http://schemas.microsoft.com/office/drawing/2014/main" id="{28249B5A-CD69-4F0F-B04B-7141A79EC7F2}"/>
               </a:ext>
             </a:extLst>
           </p:cNvPr>
@@ -12745,291 +12745,18 @@
         </p:nvGrpSpPr>
         <p:grpSpPr>
           <a:xfrm>
-            <a:off x="0" y="2133655"/>
-            <a:ext cx="2194368" cy="279850"/>
-            <a:chOff x="0" y="1863226"/>
-            <a:chExt cx="2194368" cy="279850"/>
+            <a:off x="0" y="2151442"/>
+            <a:ext cx="2171699" cy="242954"/>
+            <a:chOff x="0" y="1384139"/>
+            <a:chExt cx="2171699" cy="242954"/>
           </a:xfrm>
         </p:grpSpPr>
-        <p:grpSp>
-          <p:nvGrpSpPr>
-            <p:cNvPr id="187" name="组合 186">
+        <p:sp>
+          <p:nvSpPr>
+            <p:cNvPr id="188" name="矩形 187">
               <a:extLst>
                 <a:ext uri="{FF2B5EF4-FFF2-40B4-BE49-F238E27FC236}">
-                  <a16:creationId xmlns:a16="http://schemas.microsoft.com/office/drawing/2014/main" id="{28249B5A-CD69-4F0F-B04B-7141A79EC7F2}"/>
-                </a:ext>
-              </a:extLst>
-            </p:cNvPr>
-            <p:cNvGrpSpPr/>
-            <p:nvPr/>
-          </p:nvGrpSpPr>
-          <p:grpSpPr>
-            <a:xfrm>
-              <a:off x="0" y="1881013"/>
-              <a:ext cx="2171699" cy="242954"/>
-              <a:chOff x="0" y="1384139"/>
-              <a:chExt cx="2171699" cy="242954"/>
-            </a:xfrm>
-          </p:grpSpPr>
-          <p:sp>
-            <p:nvSpPr>
-              <p:cNvPr id="188" name="矩形 187">
-                <a:extLst>
-                  <a:ext uri="{FF2B5EF4-FFF2-40B4-BE49-F238E27FC236}">
-                    <a16:creationId xmlns:a16="http://schemas.microsoft.com/office/drawing/2014/main" id="{4D5E87C2-77E9-46CB-9DA0-9B31B48BB931}"/>
-                  </a:ext>
-                </a:extLst>
-              </p:cNvPr>
-              <p:cNvSpPr/>
-              <p:nvPr/>
-            </p:nvSpPr>
-            <p:spPr>
-              <a:xfrm>
-                <a:off x="245064" y="1384139"/>
-                <a:ext cx="1926635" cy="239534"/>
-              </a:xfrm>
-              <a:prstGeom prst="rect">
-                <a:avLst/>
-              </a:prstGeom>
-              <a:noFill/>
-              <a:ln w="3175">
-                <a:solidFill>
-                  <a:schemeClr val="bg1">
-                    <a:alpha val="10000"/>
-                  </a:schemeClr>
-                </a:solidFill>
-              </a:ln>
-            </p:spPr>
-            <p:style>
-              <a:lnRef idx="2">
-                <a:schemeClr val="accent1">
-                  <a:shade val="50000"/>
-                </a:schemeClr>
-              </a:lnRef>
-              <a:fillRef idx="1">
-                <a:schemeClr val="accent1"/>
-              </a:fillRef>
-              <a:effectRef idx="0">
-                <a:schemeClr val="accent1"/>
-              </a:effectRef>
-              <a:fontRef idx="minor">
-                <a:schemeClr val="lt1"/>
-              </a:fontRef>
-            </p:style>
-            <p:txBody>
-              <a:bodyPr rtlCol="0" anchor="ctr"/>
-              <a:lstStyle/>
-              <a:p>
-                <a:pPr algn="ctr"/>
-                <a:endParaRPr lang="zh-CN" altLang="en-US"/>
-              </a:p>
-            </p:txBody>
-          </p:sp>
-          <p:sp>
-            <p:nvSpPr>
-              <p:cNvPr id="189" name="矩形 188">
-                <a:extLst>
-                  <a:ext uri="{FF2B5EF4-FFF2-40B4-BE49-F238E27FC236}">
-                    <a16:creationId xmlns:a16="http://schemas.microsoft.com/office/drawing/2014/main" id="{A1167AC0-D9C8-417B-B82C-E7F2F65C031B}"/>
-                  </a:ext>
-                </a:extLst>
-              </p:cNvPr>
-              <p:cNvSpPr/>
-              <p:nvPr/>
-            </p:nvSpPr>
-            <p:spPr>
-              <a:xfrm>
-                <a:off x="265800" y="1403853"/>
-                <a:ext cx="1884679" cy="202850"/>
-              </a:xfrm>
-              <a:prstGeom prst="rect">
-                <a:avLst/>
-              </a:prstGeom>
-              <a:solidFill>
-                <a:schemeClr val="bg2">
-                  <a:lumMod val="10000"/>
-                  <a:alpha val="20000"/>
-                </a:schemeClr>
-              </a:solidFill>
-              <a:ln w="3175">
-                <a:noFill/>
-              </a:ln>
-            </p:spPr>
-            <p:style>
-              <a:lnRef idx="2">
-                <a:schemeClr val="accent1">
-                  <a:shade val="50000"/>
-                </a:schemeClr>
-              </a:lnRef>
-              <a:fillRef idx="1">
-                <a:schemeClr val="accent1"/>
-              </a:fillRef>
-              <a:effectRef idx="0">
-                <a:schemeClr val="accent1"/>
-              </a:effectRef>
-              <a:fontRef idx="minor">
-                <a:schemeClr val="lt1"/>
-              </a:fontRef>
-            </p:style>
-            <p:txBody>
-              <a:bodyPr rtlCol="0" anchor="ctr"/>
-              <a:lstStyle/>
-              <a:p>
-                <a:pPr algn="ctr"/>
-                <a:endParaRPr lang="zh-CN" altLang="en-US"/>
-              </a:p>
-            </p:txBody>
-          </p:sp>
-          <p:sp>
-            <p:nvSpPr>
-              <p:cNvPr id="190" name="文本框 189">
-                <a:extLst>
-                  <a:ext uri="{FF2B5EF4-FFF2-40B4-BE49-F238E27FC236}">
-                    <a16:creationId xmlns:a16="http://schemas.microsoft.com/office/drawing/2014/main" id="{03FD7D8F-9026-41AF-AA52-0A6B2FD71385}"/>
-                  </a:ext>
-                </a:extLst>
-              </p:cNvPr>
-              <p:cNvSpPr txBox="1"/>
-              <p:nvPr/>
-            </p:nvSpPr>
-            <p:spPr>
-              <a:xfrm>
-                <a:off x="244580" y="1396261"/>
-                <a:ext cx="1458513" cy="230832"/>
-              </a:xfrm>
-              <a:prstGeom prst="rect">
-                <a:avLst/>
-              </a:prstGeom>
-              <a:noFill/>
-            </p:spPr>
-            <p:txBody>
-              <a:bodyPr wrap="square" rtlCol="0">
-                <a:spAutoFit/>
-              </a:bodyPr>
-              <a:lstStyle/>
-              <a:p>
-                <a:r>
-                  <a:rPr lang="zh-CN" altLang="en-US" sz="900" dirty="0">
-                    <a:solidFill>
-                      <a:schemeClr val="bg1">
-                        <a:alpha val="70000"/>
-                      </a:schemeClr>
-                    </a:solidFill>
-                    <a:latin typeface="微软雅黑" panose="020B0503020204020204" pitchFamily="34" charset="-122"/>
-                    <a:ea typeface="微软雅黑" panose="020B0503020204020204" pitchFamily="34" charset="-122"/>
-                  </a:rPr>
-                  <a:t>希格斯材料回收</a:t>
-                </a:r>
-              </a:p>
-            </p:txBody>
-          </p:sp>
-          <p:cxnSp>
-            <p:nvCxnSpPr>
-              <p:cNvPr id="193" name="直接连接符 192">
-                <a:extLst>
-                  <a:ext uri="{FF2B5EF4-FFF2-40B4-BE49-F238E27FC236}">
-                    <a16:creationId xmlns:a16="http://schemas.microsoft.com/office/drawing/2014/main" id="{8C725EEB-2CA3-4002-AAF8-EE0ACF1F6B88}"/>
-                  </a:ext>
-                </a:extLst>
-              </p:cNvPr>
-              <p:cNvCxnSpPr>
-                <a:cxnSpLocks/>
-                <a:endCxn id="194" idx="1"/>
-              </p:cNvCxnSpPr>
-              <p:nvPr/>
-            </p:nvCxnSpPr>
-            <p:spPr>
-              <a:xfrm>
-                <a:off x="0" y="1506219"/>
-                <a:ext cx="199366" cy="0"/>
-              </a:xfrm>
-              <a:prstGeom prst="line">
-                <a:avLst/>
-              </a:prstGeom>
-              <a:ln w="6350">
-                <a:solidFill>
-                  <a:schemeClr val="bg1">
-                    <a:alpha val="40000"/>
-                  </a:schemeClr>
-                </a:solidFill>
-              </a:ln>
-            </p:spPr>
-            <p:style>
-              <a:lnRef idx="1">
-                <a:schemeClr val="accent1"/>
-              </a:lnRef>
-              <a:fillRef idx="0">
-                <a:schemeClr val="accent1"/>
-              </a:fillRef>
-              <a:effectRef idx="0">
-                <a:schemeClr val="accent1"/>
-              </a:effectRef>
-              <a:fontRef idx="minor">
-                <a:schemeClr val="tx1"/>
-              </a:fontRef>
-            </p:style>
-          </p:cxnSp>
-          <p:sp>
-            <p:nvSpPr>
-              <p:cNvPr id="194" name="矩形 193">
-                <a:extLst>
-                  <a:ext uri="{FF2B5EF4-FFF2-40B4-BE49-F238E27FC236}">
-                    <a16:creationId xmlns:a16="http://schemas.microsoft.com/office/drawing/2014/main" id="{49D09BD3-E879-4190-8163-7F824E04A62F}"/>
-                  </a:ext>
-                </a:extLst>
-              </p:cNvPr>
-              <p:cNvSpPr/>
-              <p:nvPr/>
-            </p:nvSpPr>
-            <p:spPr>
-              <a:xfrm>
-                <a:off x="199366" y="1483359"/>
-                <a:ext cx="45719" cy="45719"/>
-              </a:xfrm>
-              <a:prstGeom prst="rect">
-                <a:avLst/>
-              </a:prstGeom>
-              <a:solidFill>
-                <a:schemeClr val="bg1">
-                  <a:alpha val="40000"/>
-                </a:schemeClr>
-              </a:solidFill>
-              <a:ln>
-                <a:noFill/>
-              </a:ln>
-            </p:spPr>
-            <p:style>
-              <a:lnRef idx="2">
-                <a:schemeClr val="accent1">
-                  <a:shade val="50000"/>
-                </a:schemeClr>
-              </a:lnRef>
-              <a:fillRef idx="1">
-                <a:schemeClr val="accent1"/>
-              </a:fillRef>
-              <a:effectRef idx="0">
-                <a:schemeClr val="accent1"/>
-              </a:effectRef>
-              <a:fontRef idx="minor">
-                <a:schemeClr val="lt1"/>
-              </a:fontRef>
-            </p:style>
-            <p:txBody>
-              <a:bodyPr rtlCol="0" anchor="ctr"/>
-              <a:lstStyle/>
-              <a:p>
-                <a:pPr algn="ctr"/>
-                <a:endParaRPr lang="zh-CN" altLang="en-US"/>
-              </a:p>
-            </p:txBody>
-          </p:sp>
-        </p:grpSp>
-        <p:sp>
-          <p:nvSpPr>
-            <p:cNvPr id="1028" name="矩形 1027">
-              <a:extLst>
-                <a:ext uri="{FF2B5EF4-FFF2-40B4-BE49-F238E27FC236}">
-                  <a16:creationId xmlns:a16="http://schemas.microsoft.com/office/drawing/2014/main" id="{7114CBFD-8CA8-4488-9776-4D85270C2C77}"/>
+                  <a16:creationId xmlns:a16="http://schemas.microsoft.com/office/drawing/2014/main" id="{4D5E87C2-77E9-46CB-9DA0-9B31B48BB931}"/>
                 </a:ext>
               </a:extLst>
             </p:cNvPr>
@@ -13038,7 +12765,205 @@
           </p:nvSpPr>
           <p:spPr>
             <a:xfrm>
-              <a:off x="2148334" y="1863226"/>
+              <a:off x="245064" y="1384139"/>
+              <a:ext cx="1926635" cy="239534"/>
+            </a:xfrm>
+            <a:prstGeom prst="rect">
+              <a:avLst/>
+            </a:prstGeom>
+            <a:noFill/>
+            <a:ln w="3175">
+              <a:solidFill>
+                <a:schemeClr val="bg1">
+                  <a:alpha val="10000"/>
+                </a:schemeClr>
+              </a:solidFill>
+            </a:ln>
+          </p:spPr>
+          <p:style>
+            <a:lnRef idx="2">
+              <a:schemeClr val="accent1">
+                <a:shade val="50000"/>
+              </a:schemeClr>
+            </a:lnRef>
+            <a:fillRef idx="1">
+              <a:schemeClr val="accent1"/>
+            </a:fillRef>
+            <a:effectRef idx="0">
+              <a:schemeClr val="accent1"/>
+            </a:effectRef>
+            <a:fontRef idx="minor">
+              <a:schemeClr val="lt1"/>
+            </a:fontRef>
+          </p:style>
+          <p:txBody>
+            <a:bodyPr rtlCol="0" anchor="ctr"/>
+            <a:lstStyle/>
+            <a:p>
+              <a:pPr algn="ctr"/>
+              <a:endParaRPr lang="zh-CN" altLang="en-US"/>
+            </a:p>
+          </p:txBody>
+        </p:sp>
+        <p:sp>
+          <p:nvSpPr>
+            <p:cNvPr id="189" name="矩形 188">
+              <a:extLst>
+                <a:ext uri="{FF2B5EF4-FFF2-40B4-BE49-F238E27FC236}">
+                  <a16:creationId xmlns:a16="http://schemas.microsoft.com/office/drawing/2014/main" id="{A1167AC0-D9C8-417B-B82C-E7F2F65C031B}"/>
+                </a:ext>
+              </a:extLst>
+            </p:cNvPr>
+            <p:cNvSpPr/>
+            <p:nvPr/>
+          </p:nvSpPr>
+          <p:spPr>
+            <a:xfrm>
+              <a:off x="265800" y="1403853"/>
+              <a:ext cx="1884679" cy="202850"/>
+            </a:xfrm>
+            <a:prstGeom prst="rect">
+              <a:avLst/>
+            </a:prstGeom>
+            <a:solidFill>
+              <a:schemeClr val="bg2">
+                <a:lumMod val="10000"/>
+                <a:alpha val="20000"/>
+              </a:schemeClr>
+            </a:solidFill>
+            <a:ln w="3175">
+              <a:noFill/>
+            </a:ln>
+          </p:spPr>
+          <p:style>
+            <a:lnRef idx="2">
+              <a:schemeClr val="accent1">
+                <a:shade val="50000"/>
+              </a:schemeClr>
+            </a:lnRef>
+            <a:fillRef idx="1">
+              <a:schemeClr val="accent1"/>
+            </a:fillRef>
+            <a:effectRef idx="0">
+              <a:schemeClr val="accent1"/>
+            </a:effectRef>
+            <a:fontRef idx="minor">
+              <a:schemeClr val="lt1"/>
+            </a:fontRef>
+          </p:style>
+          <p:txBody>
+            <a:bodyPr rtlCol="0" anchor="ctr"/>
+            <a:lstStyle/>
+            <a:p>
+              <a:pPr algn="ctr"/>
+              <a:endParaRPr lang="zh-CN" altLang="en-US"/>
+            </a:p>
+          </p:txBody>
+        </p:sp>
+        <p:sp>
+          <p:nvSpPr>
+            <p:cNvPr id="190" name="文本框 189">
+              <a:extLst>
+                <a:ext uri="{FF2B5EF4-FFF2-40B4-BE49-F238E27FC236}">
+                  <a16:creationId xmlns:a16="http://schemas.microsoft.com/office/drawing/2014/main" id="{03FD7D8F-9026-41AF-AA52-0A6B2FD71385}"/>
+                </a:ext>
+              </a:extLst>
+            </p:cNvPr>
+            <p:cNvSpPr txBox="1"/>
+            <p:nvPr/>
+          </p:nvSpPr>
+          <p:spPr>
+            <a:xfrm>
+              <a:off x="244580" y="1396261"/>
+              <a:ext cx="1458513" cy="230832"/>
+            </a:xfrm>
+            <a:prstGeom prst="rect">
+              <a:avLst/>
+            </a:prstGeom>
+            <a:noFill/>
+          </p:spPr>
+          <p:txBody>
+            <a:bodyPr wrap="square" rtlCol="0">
+              <a:spAutoFit/>
+            </a:bodyPr>
+            <a:lstStyle/>
+            <a:p>
+              <a:r>
+                <a:rPr lang="zh-CN" altLang="en-US" sz="900" dirty="0">
+                  <a:solidFill>
+                    <a:schemeClr val="bg1">
+                      <a:alpha val="70000"/>
+                    </a:schemeClr>
+                  </a:solidFill>
+                  <a:latin typeface="微软雅黑" panose="020B0503020204020204" pitchFamily="34" charset="-122"/>
+                  <a:ea typeface="微软雅黑" panose="020B0503020204020204" pitchFamily="34" charset="-122"/>
+                </a:rPr>
+                <a:t>希格斯材料回收</a:t>
+              </a:r>
+            </a:p>
+          </p:txBody>
+        </p:sp>
+        <p:cxnSp>
+          <p:nvCxnSpPr>
+            <p:cNvPr id="193" name="直接连接符 192">
+              <a:extLst>
+                <a:ext uri="{FF2B5EF4-FFF2-40B4-BE49-F238E27FC236}">
+                  <a16:creationId xmlns:a16="http://schemas.microsoft.com/office/drawing/2014/main" id="{8C725EEB-2CA3-4002-AAF8-EE0ACF1F6B88}"/>
+                </a:ext>
+              </a:extLst>
+            </p:cNvPr>
+            <p:cNvCxnSpPr>
+              <a:cxnSpLocks/>
+              <a:endCxn id="194" idx="1"/>
+            </p:cNvCxnSpPr>
+            <p:nvPr/>
+          </p:nvCxnSpPr>
+          <p:spPr>
+            <a:xfrm>
+              <a:off x="0" y="1506219"/>
+              <a:ext cx="199366" cy="0"/>
+            </a:xfrm>
+            <a:prstGeom prst="line">
+              <a:avLst/>
+            </a:prstGeom>
+            <a:ln w="6350">
+              <a:solidFill>
+                <a:schemeClr val="bg1">
+                  <a:alpha val="40000"/>
+                </a:schemeClr>
+              </a:solidFill>
+            </a:ln>
+          </p:spPr>
+          <p:style>
+            <a:lnRef idx="1">
+              <a:schemeClr val="accent1"/>
+            </a:lnRef>
+            <a:fillRef idx="0">
+              <a:schemeClr val="accent1"/>
+            </a:fillRef>
+            <a:effectRef idx="0">
+              <a:schemeClr val="accent1"/>
+            </a:effectRef>
+            <a:fontRef idx="minor">
+              <a:schemeClr val="tx1"/>
+            </a:fontRef>
+          </p:style>
+        </p:cxnSp>
+        <p:sp>
+          <p:nvSpPr>
+            <p:cNvPr id="194" name="矩形 193">
+              <a:extLst>
+                <a:ext uri="{FF2B5EF4-FFF2-40B4-BE49-F238E27FC236}">
+                  <a16:creationId xmlns:a16="http://schemas.microsoft.com/office/drawing/2014/main" id="{49D09BD3-E879-4190-8163-7F824E04A62F}"/>
+                </a:ext>
+              </a:extLst>
+            </p:cNvPr>
+            <p:cNvSpPr/>
+            <p:nvPr/>
+          </p:nvSpPr>
+          <p:spPr>
+            <a:xfrm>
+              <a:off x="199366" y="1483359"/>
               <a:ext cx="45719" cy="45719"/>
             </a:xfrm>
             <a:prstGeom prst="rect">
@@ -13046,7 +12971,7 @@
             </a:prstGeom>
             <a:solidFill>
               <a:schemeClr val="bg1">
-                <a:alpha val="50000"/>
+                <a:alpha val="40000"/>
               </a:schemeClr>
             </a:solidFill>
             <a:ln>
@@ -13078,1005 +13003,1059 @@
             </a:p>
           </p:txBody>
         </p:sp>
+      </p:grpSp>
+      <p:sp>
+        <p:nvSpPr>
+          <p:cNvPr id="1028" name="矩形 1027">
+            <a:extLst>
+              <a:ext uri="{FF2B5EF4-FFF2-40B4-BE49-F238E27FC236}">
+                <a16:creationId xmlns:a16="http://schemas.microsoft.com/office/drawing/2014/main" id="{7114CBFD-8CA8-4488-9776-4D85270C2C77}"/>
+              </a:ext>
+            </a:extLst>
+          </p:cNvPr>
+          <p:cNvSpPr/>
+          <p:nvPr/>
+        </p:nvSpPr>
+        <p:spPr>
+          <a:xfrm>
+            <a:off x="2148334" y="2133655"/>
+            <a:ext cx="45719" cy="45719"/>
+          </a:xfrm>
+          <a:prstGeom prst="rect">
+            <a:avLst/>
+          </a:prstGeom>
+          <a:solidFill>
+            <a:schemeClr val="bg1">
+              <a:alpha val="50000"/>
+            </a:schemeClr>
+          </a:solidFill>
+          <a:ln>
+            <a:noFill/>
+          </a:ln>
+        </p:spPr>
+        <p:style>
+          <a:lnRef idx="2">
+            <a:schemeClr val="accent1">
+              <a:shade val="50000"/>
+            </a:schemeClr>
+          </a:lnRef>
+          <a:fillRef idx="1">
+            <a:schemeClr val="accent1"/>
+          </a:fillRef>
+          <a:effectRef idx="0">
+            <a:schemeClr val="accent1"/>
+          </a:effectRef>
+          <a:fontRef idx="minor">
+            <a:schemeClr val="lt1"/>
+          </a:fontRef>
+        </p:style>
+        <p:txBody>
+          <a:bodyPr rtlCol="0" anchor="ctr"/>
+          <a:lstStyle/>
+          <a:p>
+            <a:pPr algn="ctr"/>
+            <a:endParaRPr lang="zh-CN" altLang="en-US"/>
+          </a:p>
+        </p:txBody>
+      </p:sp>
+      <p:sp>
+        <p:nvSpPr>
+          <p:cNvPr id="202" name="矩形 201">
+            <a:extLst>
+              <a:ext uri="{FF2B5EF4-FFF2-40B4-BE49-F238E27FC236}">
+                <a16:creationId xmlns:a16="http://schemas.microsoft.com/office/drawing/2014/main" id="{21C3DFFB-BEDA-4572-9D76-46FC89575F48}"/>
+              </a:ext>
+            </a:extLst>
+          </p:cNvPr>
+          <p:cNvSpPr/>
+          <p:nvPr/>
+        </p:nvSpPr>
+        <p:spPr>
+          <a:xfrm>
+            <a:off x="2148649" y="2367786"/>
+            <a:ext cx="45719" cy="45719"/>
+          </a:xfrm>
+          <a:prstGeom prst="rect">
+            <a:avLst/>
+          </a:prstGeom>
+          <a:solidFill>
+            <a:schemeClr val="bg1">
+              <a:alpha val="50000"/>
+            </a:schemeClr>
+          </a:solidFill>
+          <a:ln>
+            <a:noFill/>
+          </a:ln>
+        </p:spPr>
+        <p:style>
+          <a:lnRef idx="2">
+            <a:schemeClr val="accent1">
+              <a:shade val="50000"/>
+            </a:schemeClr>
+          </a:lnRef>
+          <a:fillRef idx="1">
+            <a:schemeClr val="accent1"/>
+          </a:fillRef>
+          <a:effectRef idx="0">
+            <a:schemeClr val="accent1"/>
+          </a:effectRef>
+          <a:fontRef idx="minor">
+            <a:schemeClr val="lt1"/>
+          </a:fontRef>
+        </p:style>
+        <p:txBody>
+          <a:bodyPr rtlCol="0" anchor="ctr"/>
+          <a:lstStyle/>
+          <a:p>
+            <a:pPr algn="ctr"/>
+            <a:endParaRPr lang="zh-CN" altLang="en-US"/>
+          </a:p>
+        </p:txBody>
+      </p:sp>
+      <p:grpSp>
+        <p:nvGrpSpPr>
+          <p:cNvPr id="203" name="组合 202">
+            <a:extLst>
+              <a:ext uri="{FF2B5EF4-FFF2-40B4-BE49-F238E27FC236}">
+                <a16:creationId xmlns:a16="http://schemas.microsoft.com/office/drawing/2014/main" id="{6F36ACF9-1381-4470-98CA-9A1EF491FF03}"/>
+              </a:ext>
+            </a:extLst>
+          </p:cNvPr>
+          <p:cNvGrpSpPr/>
+          <p:nvPr/>
+        </p:nvGrpSpPr>
+        <p:grpSpPr>
+          <a:xfrm>
+            <a:off x="1935659" y="2174741"/>
+            <a:ext cx="188744" cy="188744"/>
+            <a:chOff x="5254105" y="3666741"/>
+            <a:chExt cx="541365" cy="541365"/>
+          </a:xfrm>
+          <a:solidFill>
+            <a:srgbClr val="00B0F0"/>
+          </a:solidFill>
+        </p:grpSpPr>
         <p:sp>
           <p:nvSpPr>
-            <p:cNvPr id="202" name="矩形 201">
+            <p:cNvPr id="204" name="Freeform 162">
               <a:extLst>
                 <a:ext uri="{FF2B5EF4-FFF2-40B4-BE49-F238E27FC236}">
-                  <a16:creationId xmlns:a16="http://schemas.microsoft.com/office/drawing/2014/main" id="{21C3DFFB-BEDA-4572-9D76-46FC89575F48}"/>
+                  <a16:creationId xmlns:a16="http://schemas.microsoft.com/office/drawing/2014/main" id="{B95093CE-3822-4A65-B418-01C42AE4D13F}"/>
                 </a:ext>
               </a:extLst>
             </p:cNvPr>
-            <p:cNvSpPr/>
+            <p:cNvSpPr>
+              <a:spLocks/>
+            </p:cNvSpPr>
             <p:nvPr/>
           </p:nvSpPr>
-          <p:spPr>
+          <p:spPr bwMode="auto">
             <a:xfrm>
-              <a:off x="2148649" y="2097357"/>
-              <a:ext cx="45719" cy="45719"/>
+              <a:off x="5542285" y="4115477"/>
+              <a:ext cx="154382" cy="92629"/>
             </a:xfrm>
-            <a:prstGeom prst="rect">
+            <a:custGeom>
               <a:avLst/>
-            </a:prstGeom>
-            <a:solidFill>
-              <a:schemeClr val="bg1">
-                <a:alpha val="50000"/>
-              </a:schemeClr>
-            </a:solidFill>
+              <a:gdLst>
+                <a:gd name="T0" fmla="*/ 0 w 32"/>
+                <a:gd name="T1" fmla="*/ 10 h 19"/>
+                <a:gd name="T2" fmla="*/ 0 w 32"/>
+                <a:gd name="T3" fmla="*/ 19 h 19"/>
+                <a:gd name="T4" fmla="*/ 32 w 32"/>
+                <a:gd name="T5" fmla="*/ 7 h 19"/>
+                <a:gd name="T6" fmla="*/ 26 w 32"/>
+                <a:gd name="T7" fmla="*/ 0 h 19"/>
+                <a:gd name="T8" fmla="*/ 0 w 32"/>
+                <a:gd name="T9" fmla="*/ 10 h 19"/>
+              </a:gdLst>
+              <a:ahLst/>
+              <a:cxnLst>
+                <a:cxn ang="0">
+                  <a:pos x="T0" y="T1"/>
+                </a:cxn>
+                <a:cxn ang="0">
+                  <a:pos x="T2" y="T3"/>
+                </a:cxn>
+                <a:cxn ang="0">
+                  <a:pos x="T4" y="T5"/>
+                </a:cxn>
+                <a:cxn ang="0">
+                  <a:pos x="T6" y="T7"/>
+                </a:cxn>
+                <a:cxn ang="0">
+                  <a:pos x="T8" y="T9"/>
+                </a:cxn>
+              </a:cxnLst>
+              <a:rect l="0" t="0" r="r" b="b"/>
+              <a:pathLst>
+                <a:path w="32" h="19">
+                  <a:moveTo>
+                    <a:pt x="0" y="10"/>
+                  </a:moveTo>
+                  <a:cubicBezTo>
+                    <a:pt x="0" y="19"/>
+                    <a:pt x="0" y="19"/>
+                    <a:pt x="0" y="19"/>
+                  </a:cubicBezTo>
+                  <a:cubicBezTo>
+                    <a:pt x="12" y="19"/>
+                    <a:pt x="23" y="14"/>
+                    <a:pt x="32" y="7"/>
+                  </a:cubicBezTo>
+                  <a:cubicBezTo>
+                    <a:pt x="26" y="0"/>
+                    <a:pt x="26" y="0"/>
+                    <a:pt x="26" y="0"/>
+                  </a:cubicBezTo>
+                  <a:cubicBezTo>
+                    <a:pt x="18" y="5"/>
+                    <a:pt x="9" y="9"/>
+                    <a:pt x="0" y="10"/>
+                  </a:cubicBezTo>
+                  <a:close/>
+                </a:path>
+              </a:pathLst>
+            </a:custGeom>
+            <a:grpFill/>
             <a:ln>
               <a:noFill/>
             </a:ln>
+            <a:extLst>
+              <a:ext uri="{91240B29-F687-4F45-9708-019B960494DF}">
+                <a14:hiddenLine xmlns:a14="http://schemas.microsoft.com/office/drawing/2010/main" w="9525">
+                  <a:solidFill>
+                    <a:srgbClr val="000000"/>
+                  </a:solidFill>
+                  <a:round/>
+                  <a:headEnd/>
+                  <a:tailEnd/>
+                </a14:hiddenLine>
+              </a:ext>
+            </a:extLst>
           </p:spPr>
-          <p:style>
-            <a:lnRef idx="2">
-              <a:schemeClr val="accent1">
-                <a:shade val="50000"/>
-              </a:schemeClr>
-            </a:lnRef>
-            <a:fillRef idx="1">
-              <a:schemeClr val="accent1"/>
-            </a:fillRef>
-            <a:effectRef idx="0">
-              <a:schemeClr val="accent1"/>
-            </a:effectRef>
-            <a:fontRef idx="minor">
-              <a:schemeClr val="lt1"/>
-            </a:fontRef>
-          </p:style>
           <p:txBody>
-            <a:bodyPr rtlCol="0" anchor="ctr"/>
+            <a:bodyPr vert="horz" wrap="square" lIns="91440" tIns="45720" rIns="91440" bIns="45720" numCol="1" anchor="t" anchorCtr="0" compatLnSpc="1">
+              <a:prstTxWarp prst="textNoShape">
+                <a:avLst/>
+              </a:prstTxWarp>
+            </a:bodyPr>
             <a:lstStyle/>
             <a:p>
-              <a:pPr algn="ctr"/>
               <a:endParaRPr lang="zh-CN" altLang="en-US"/>
             </a:p>
           </p:txBody>
         </p:sp>
-        <p:grpSp>
-          <p:nvGrpSpPr>
-            <p:cNvPr id="203" name="组合 202">
+        <p:sp>
+          <p:nvSpPr>
+            <p:cNvPr id="205" name="Freeform 163">
               <a:extLst>
                 <a:ext uri="{FF2B5EF4-FFF2-40B4-BE49-F238E27FC236}">
-                  <a16:creationId xmlns:a16="http://schemas.microsoft.com/office/drawing/2014/main" id="{6F36ACF9-1381-4470-98CA-9A1EF491FF03}"/>
+                  <a16:creationId xmlns:a16="http://schemas.microsoft.com/office/drawing/2014/main" id="{D80AB4B5-5D3E-471F-AFAB-BED4C918E06B}"/>
                 </a:ext>
               </a:extLst>
             </p:cNvPr>
-            <p:cNvGrpSpPr/>
+            <p:cNvSpPr>
+              <a:spLocks/>
+            </p:cNvSpPr>
             <p:nvPr/>
-          </p:nvGrpSpPr>
-          <p:grpSpPr>
+          </p:nvSpPr>
+          <p:spPr bwMode="auto">
             <a:xfrm>
-              <a:off x="1935659" y="1904312"/>
-              <a:ext cx="188744" cy="188744"/>
-              <a:chOff x="5254105" y="3666741"/>
-              <a:chExt cx="541365" cy="541365"/>
+              <a:off x="5686374" y="3954920"/>
+              <a:ext cx="109096" cy="174966"/>
             </a:xfrm>
-            <a:solidFill>
-              <a:srgbClr val="00B0F0"/>
-            </a:solidFill>
-          </p:grpSpPr>
-          <p:sp>
-            <p:nvSpPr>
-              <p:cNvPr id="204" name="Freeform 162">
-                <a:extLst>
-                  <a:ext uri="{FF2B5EF4-FFF2-40B4-BE49-F238E27FC236}">
-                    <a16:creationId xmlns:a16="http://schemas.microsoft.com/office/drawing/2014/main" id="{B95093CE-3822-4A65-B418-01C42AE4D13F}"/>
-                  </a:ext>
-                </a:extLst>
-              </p:cNvPr>
-              <p:cNvSpPr>
-                <a:spLocks/>
-              </p:cNvSpPr>
-              <p:nvPr/>
-            </p:nvSpPr>
-            <p:spPr bwMode="auto">
-              <a:xfrm>
-                <a:off x="5542285" y="4115477"/>
-                <a:ext cx="154382" cy="92629"/>
-              </a:xfrm>
-              <a:custGeom>
+            <a:custGeom>
+              <a:avLst/>
+              <a:gdLst>
+                <a:gd name="T0" fmla="*/ 0 w 22"/>
+                <a:gd name="T1" fmla="*/ 29 h 36"/>
+                <a:gd name="T2" fmla="*/ 6 w 22"/>
+                <a:gd name="T3" fmla="*/ 36 h 36"/>
+                <a:gd name="T4" fmla="*/ 22 w 22"/>
+                <a:gd name="T5" fmla="*/ 0 h 36"/>
+                <a:gd name="T6" fmla="*/ 13 w 22"/>
+                <a:gd name="T7" fmla="*/ 0 h 36"/>
+                <a:gd name="T8" fmla="*/ 0 w 22"/>
+                <a:gd name="T9" fmla="*/ 29 h 36"/>
+              </a:gdLst>
+              <a:ahLst/>
+              <a:cxnLst>
+                <a:cxn ang="0">
+                  <a:pos x="T0" y="T1"/>
+                </a:cxn>
+                <a:cxn ang="0">
+                  <a:pos x="T2" y="T3"/>
+                </a:cxn>
+                <a:cxn ang="0">
+                  <a:pos x="T4" y="T5"/>
+                </a:cxn>
+                <a:cxn ang="0">
+                  <a:pos x="T6" y="T7"/>
+                </a:cxn>
+                <a:cxn ang="0">
+                  <a:pos x="T8" y="T9"/>
+                </a:cxn>
+              </a:cxnLst>
+              <a:rect l="0" t="0" r="r" b="b"/>
+              <a:pathLst>
+                <a:path w="22" h="36">
+                  <a:moveTo>
+                    <a:pt x="0" y="29"/>
+                  </a:moveTo>
+                  <a:cubicBezTo>
+                    <a:pt x="6" y="36"/>
+                    <a:pt x="6" y="36"/>
+                    <a:pt x="6" y="36"/>
+                  </a:cubicBezTo>
+                  <a:cubicBezTo>
+                    <a:pt x="16" y="26"/>
+                    <a:pt x="22" y="14"/>
+                    <a:pt x="22" y="0"/>
+                  </a:cubicBezTo>
+                  <a:cubicBezTo>
+                    <a:pt x="13" y="0"/>
+                    <a:pt x="13" y="0"/>
+                    <a:pt x="13" y="0"/>
+                  </a:cubicBezTo>
+                  <a:cubicBezTo>
+                    <a:pt x="12" y="11"/>
+                    <a:pt x="7" y="21"/>
+                    <a:pt x="0" y="29"/>
+                  </a:cubicBezTo>
+                  <a:close/>
+                </a:path>
+              </a:pathLst>
+            </a:custGeom>
+            <a:grpFill/>
+            <a:ln>
+              <a:noFill/>
+            </a:ln>
+            <a:extLst>
+              <a:ext uri="{91240B29-F687-4F45-9708-019B960494DF}">
+                <a14:hiddenLine xmlns:a14="http://schemas.microsoft.com/office/drawing/2010/main" w="9525">
+                  <a:solidFill>
+                    <a:srgbClr val="000000"/>
+                  </a:solidFill>
+                  <a:round/>
+                  <a:headEnd/>
+                  <a:tailEnd/>
+                </a14:hiddenLine>
+              </a:ext>
+            </a:extLst>
+          </p:spPr>
+          <p:txBody>
+            <a:bodyPr vert="horz" wrap="square" lIns="91440" tIns="45720" rIns="91440" bIns="45720" numCol="1" anchor="t" anchorCtr="0" compatLnSpc="1">
+              <a:prstTxWarp prst="textNoShape">
                 <a:avLst/>
-                <a:gdLst>
-                  <a:gd name="T0" fmla="*/ 0 w 32"/>
-                  <a:gd name="T1" fmla="*/ 10 h 19"/>
-                  <a:gd name="T2" fmla="*/ 0 w 32"/>
-                  <a:gd name="T3" fmla="*/ 19 h 19"/>
-                  <a:gd name="T4" fmla="*/ 32 w 32"/>
-                  <a:gd name="T5" fmla="*/ 7 h 19"/>
-                  <a:gd name="T6" fmla="*/ 26 w 32"/>
-                  <a:gd name="T7" fmla="*/ 0 h 19"/>
-                  <a:gd name="T8" fmla="*/ 0 w 32"/>
-                  <a:gd name="T9" fmla="*/ 10 h 19"/>
-                </a:gdLst>
-                <a:ahLst/>
-                <a:cxnLst>
-                  <a:cxn ang="0">
-                    <a:pos x="T0" y="T1"/>
-                  </a:cxn>
-                  <a:cxn ang="0">
-                    <a:pos x="T2" y="T3"/>
-                  </a:cxn>
-                  <a:cxn ang="0">
-                    <a:pos x="T4" y="T5"/>
-                  </a:cxn>
-                  <a:cxn ang="0">
-                    <a:pos x="T6" y="T7"/>
-                  </a:cxn>
-                  <a:cxn ang="0">
-                    <a:pos x="T8" y="T9"/>
-                  </a:cxn>
-                </a:cxnLst>
-                <a:rect l="0" t="0" r="r" b="b"/>
-                <a:pathLst>
-                  <a:path w="32" h="19">
-                    <a:moveTo>
-                      <a:pt x="0" y="10"/>
-                    </a:moveTo>
-                    <a:cubicBezTo>
-                      <a:pt x="0" y="19"/>
-                      <a:pt x="0" y="19"/>
-                      <a:pt x="0" y="19"/>
-                    </a:cubicBezTo>
-                    <a:cubicBezTo>
-                      <a:pt x="12" y="19"/>
-                      <a:pt x="23" y="14"/>
-                      <a:pt x="32" y="7"/>
-                    </a:cubicBezTo>
-                    <a:cubicBezTo>
-                      <a:pt x="26" y="0"/>
-                      <a:pt x="26" y="0"/>
-                      <a:pt x="26" y="0"/>
-                    </a:cubicBezTo>
-                    <a:cubicBezTo>
-                      <a:pt x="18" y="5"/>
-                      <a:pt x="9" y="9"/>
-                      <a:pt x="0" y="10"/>
-                    </a:cubicBezTo>
-                    <a:close/>
-                  </a:path>
-                </a:pathLst>
-              </a:custGeom>
-              <a:grpFill/>
-              <a:ln>
-                <a:noFill/>
-              </a:ln>
-              <a:extLst>
-                <a:ext uri="{91240B29-F687-4F45-9708-019B960494DF}">
-                  <a14:hiddenLine xmlns:a14="http://schemas.microsoft.com/office/drawing/2010/main" w="9525">
-                    <a:solidFill>
-                      <a:srgbClr val="000000"/>
-                    </a:solidFill>
-                    <a:round/>
-                    <a:headEnd/>
-                    <a:tailEnd/>
-                  </a14:hiddenLine>
-                </a:ext>
-              </a:extLst>
-            </p:spPr>
-            <p:txBody>
-              <a:bodyPr vert="horz" wrap="square" lIns="91440" tIns="45720" rIns="91440" bIns="45720" numCol="1" anchor="t" anchorCtr="0" compatLnSpc="1">
-                <a:prstTxWarp prst="textNoShape">
-                  <a:avLst/>
-                </a:prstTxWarp>
-              </a:bodyPr>
-              <a:lstStyle/>
-              <a:p>
-                <a:endParaRPr lang="zh-CN" altLang="en-US"/>
-              </a:p>
-            </p:txBody>
-          </p:sp>
-          <p:sp>
-            <p:nvSpPr>
-              <p:cNvPr id="205" name="Freeform 163">
-                <a:extLst>
-                  <a:ext uri="{FF2B5EF4-FFF2-40B4-BE49-F238E27FC236}">
-                    <a16:creationId xmlns:a16="http://schemas.microsoft.com/office/drawing/2014/main" id="{D80AB4B5-5D3E-471F-AFAB-BED4C918E06B}"/>
-                  </a:ext>
-                </a:extLst>
-              </p:cNvPr>
-              <p:cNvSpPr>
-                <a:spLocks/>
-              </p:cNvSpPr>
-              <p:nvPr/>
-            </p:nvSpPr>
-            <p:spPr bwMode="auto">
-              <a:xfrm>
-                <a:off x="5686374" y="3954920"/>
-                <a:ext cx="109096" cy="174966"/>
-              </a:xfrm>
-              <a:custGeom>
-                <a:avLst/>
-                <a:gdLst>
-                  <a:gd name="T0" fmla="*/ 0 w 22"/>
-                  <a:gd name="T1" fmla="*/ 29 h 36"/>
-                  <a:gd name="T2" fmla="*/ 6 w 22"/>
-                  <a:gd name="T3" fmla="*/ 36 h 36"/>
-                  <a:gd name="T4" fmla="*/ 22 w 22"/>
-                  <a:gd name="T5" fmla="*/ 0 h 36"/>
-                  <a:gd name="T6" fmla="*/ 13 w 22"/>
-                  <a:gd name="T7" fmla="*/ 0 h 36"/>
-                  <a:gd name="T8" fmla="*/ 0 w 22"/>
-                  <a:gd name="T9" fmla="*/ 29 h 36"/>
-                </a:gdLst>
-                <a:ahLst/>
-                <a:cxnLst>
-                  <a:cxn ang="0">
-                    <a:pos x="T0" y="T1"/>
-                  </a:cxn>
-                  <a:cxn ang="0">
-                    <a:pos x="T2" y="T3"/>
-                  </a:cxn>
-                  <a:cxn ang="0">
-                    <a:pos x="T4" y="T5"/>
-                  </a:cxn>
-                  <a:cxn ang="0">
-                    <a:pos x="T6" y="T7"/>
-                  </a:cxn>
-                  <a:cxn ang="0">
-                    <a:pos x="T8" y="T9"/>
-                  </a:cxn>
-                </a:cxnLst>
-                <a:rect l="0" t="0" r="r" b="b"/>
-                <a:pathLst>
-                  <a:path w="22" h="36">
-                    <a:moveTo>
-                      <a:pt x="0" y="29"/>
-                    </a:moveTo>
-                    <a:cubicBezTo>
-                      <a:pt x="6" y="36"/>
-                      <a:pt x="6" y="36"/>
-                      <a:pt x="6" y="36"/>
-                    </a:cubicBezTo>
-                    <a:cubicBezTo>
-                      <a:pt x="16" y="26"/>
-                      <a:pt x="22" y="14"/>
-                      <a:pt x="22" y="0"/>
-                    </a:cubicBezTo>
-                    <a:cubicBezTo>
-                      <a:pt x="13" y="0"/>
-                      <a:pt x="13" y="0"/>
-                      <a:pt x="13" y="0"/>
-                    </a:cubicBezTo>
-                    <a:cubicBezTo>
-                      <a:pt x="12" y="11"/>
-                      <a:pt x="7" y="21"/>
-                      <a:pt x="0" y="29"/>
-                    </a:cubicBezTo>
-                    <a:close/>
-                  </a:path>
-                </a:pathLst>
-              </a:custGeom>
-              <a:grpFill/>
-              <a:ln>
-                <a:noFill/>
-              </a:ln>
-              <a:extLst>
-                <a:ext uri="{91240B29-F687-4F45-9708-019B960494DF}">
-                  <a14:hiddenLine xmlns:a14="http://schemas.microsoft.com/office/drawing/2010/main" w="9525">
-                    <a:solidFill>
-                      <a:srgbClr val="000000"/>
-                    </a:solidFill>
-                    <a:round/>
-                    <a:headEnd/>
-                    <a:tailEnd/>
-                  </a14:hiddenLine>
-                </a:ext>
-              </a:extLst>
-            </p:spPr>
-            <p:txBody>
-              <a:bodyPr vert="horz" wrap="square" lIns="91440" tIns="45720" rIns="91440" bIns="45720" numCol="1" anchor="t" anchorCtr="0" compatLnSpc="1">
-                <a:prstTxWarp prst="textNoShape">
-                  <a:avLst/>
-                </a:prstTxWarp>
-              </a:bodyPr>
-              <a:lstStyle/>
-              <a:p>
-                <a:endParaRPr lang="zh-CN" altLang="en-US"/>
-              </a:p>
-            </p:txBody>
-          </p:sp>
-          <p:sp>
-            <p:nvSpPr>
-              <p:cNvPr id="206" name="Freeform 164">
-                <a:extLst>
-                  <a:ext uri="{FF2B5EF4-FFF2-40B4-BE49-F238E27FC236}">
-                    <a16:creationId xmlns:a16="http://schemas.microsoft.com/office/drawing/2014/main" id="{C8C987D1-E956-43FF-89A7-9E8104612F3C}"/>
-                  </a:ext>
-                </a:extLst>
-              </p:cNvPr>
-              <p:cNvSpPr>
-                <a:spLocks/>
-              </p:cNvSpPr>
-              <p:nvPr/>
-            </p:nvSpPr>
-            <p:spPr bwMode="auto">
-              <a:xfrm>
-                <a:off x="5542285" y="3666741"/>
-                <a:ext cx="168791" cy="107038"/>
-              </a:xfrm>
-              <a:custGeom>
-                <a:avLst/>
-                <a:gdLst>
-                  <a:gd name="T0" fmla="*/ 35 w 35"/>
-                  <a:gd name="T1" fmla="*/ 15 h 22"/>
-                  <a:gd name="T2" fmla="*/ 0 w 35"/>
-                  <a:gd name="T3" fmla="*/ 0 h 22"/>
-                  <a:gd name="T4" fmla="*/ 0 w 35"/>
-                  <a:gd name="T5" fmla="*/ 10 h 22"/>
-                  <a:gd name="T6" fmla="*/ 28 w 35"/>
-                  <a:gd name="T7" fmla="*/ 22 h 22"/>
-                  <a:gd name="T8" fmla="*/ 35 w 35"/>
-                  <a:gd name="T9" fmla="*/ 15 h 22"/>
-                </a:gdLst>
-                <a:ahLst/>
-                <a:cxnLst>
-                  <a:cxn ang="0">
-                    <a:pos x="T0" y="T1"/>
-                  </a:cxn>
-                  <a:cxn ang="0">
-                    <a:pos x="T2" y="T3"/>
-                  </a:cxn>
-                  <a:cxn ang="0">
-                    <a:pos x="T4" y="T5"/>
-                  </a:cxn>
-                  <a:cxn ang="0">
-                    <a:pos x="T6" y="T7"/>
-                  </a:cxn>
-                  <a:cxn ang="0">
-                    <a:pos x="T8" y="T9"/>
-                  </a:cxn>
-                </a:cxnLst>
-                <a:rect l="0" t="0" r="r" b="b"/>
-                <a:pathLst>
-                  <a:path w="35" h="22">
-                    <a:moveTo>
-                      <a:pt x="35" y="15"/>
-                    </a:moveTo>
-                    <a:cubicBezTo>
-                      <a:pt x="26" y="7"/>
-                      <a:pt x="13" y="1"/>
-                      <a:pt x="0" y="0"/>
-                    </a:cubicBezTo>
-                    <a:cubicBezTo>
-                      <a:pt x="0" y="10"/>
-                      <a:pt x="0" y="10"/>
-                      <a:pt x="0" y="10"/>
-                    </a:cubicBezTo>
-                    <a:cubicBezTo>
-                      <a:pt x="11" y="11"/>
-                      <a:pt x="21" y="15"/>
-                      <a:pt x="28" y="22"/>
-                    </a:cubicBezTo>
-                    <a:lnTo>
-                      <a:pt x="35" y="15"/>
-                    </a:lnTo>
-                    <a:close/>
-                  </a:path>
-                </a:pathLst>
-              </a:custGeom>
-              <a:grpFill/>
-              <a:ln>
-                <a:noFill/>
-              </a:ln>
-              <a:extLst>
-                <a:ext uri="{91240B29-F687-4F45-9708-019B960494DF}">
-                  <a14:hiddenLine xmlns:a14="http://schemas.microsoft.com/office/drawing/2010/main" w="9525">
-                    <a:solidFill>
-                      <a:srgbClr val="000000"/>
-                    </a:solidFill>
-                    <a:round/>
-                    <a:headEnd/>
-                    <a:tailEnd/>
-                  </a14:hiddenLine>
-                </a:ext>
-              </a:extLst>
-            </p:spPr>
-            <p:txBody>
-              <a:bodyPr vert="horz" wrap="square" lIns="91440" tIns="45720" rIns="91440" bIns="45720" numCol="1" anchor="t" anchorCtr="0" compatLnSpc="1">
-                <a:prstTxWarp prst="textNoShape">
-                  <a:avLst/>
-                </a:prstTxWarp>
-              </a:bodyPr>
-              <a:lstStyle/>
-              <a:p>
-                <a:endParaRPr lang="zh-CN" altLang="en-US"/>
-              </a:p>
-            </p:txBody>
-          </p:sp>
-          <p:sp>
-            <p:nvSpPr>
-              <p:cNvPr id="207" name="Freeform 165">
-                <a:extLst>
-                  <a:ext uri="{FF2B5EF4-FFF2-40B4-BE49-F238E27FC236}">
-                    <a16:creationId xmlns:a16="http://schemas.microsoft.com/office/drawing/2014/main" id="{B072F521-B2D2-425A-BD84-824A8E9ED90C}"/>
-                  </a:ext>
-                </a:extLst>
-              </p:cNvPr>
-              <p:cNvSpPr>
-                <a:spLocks/>
-              </p:cNvSpPr>
-              <p:nvPr/>
-            </p:nvSpPr>
-            <p:spPr bwMode="auto">
-              <a:xfrm>
-                <a:off x="5696666" y="3759370"/>
-                <a:ext cx="98804" cy="166732"/>
-              </a:xfrm>
-              <a:custGeom>
-                <a:avLst/>
-                <a:gdLst>
-                  <a:gd name="T0" fmla="*/ 11 w 20"/>
-                  <a:gd name="T1" fmla="*/ 34 h 34"/>
-                  <a:gd name="T2" fmla="*/ 20 w 20"/>
-                  <a:gd name="T3" fmla="*/ 34 h 34"/>
-                  <a:gd name="T4" fmla="*/ 7 w 20"/>
-                  <a:gd name="T5" fmla="*/ 0 h 34"/>
-                  <a:gd name="T6" fmla="*/ 0 w 20"/>
-                  <a:gd name="T7" fmla="*/ 7 h 34"/>
-                  <a:gd name="T8" fmla="*/ 11 w 20"/>
-                  <a:gd name="T9" fmla="*/ 34 h 34"/>
-                </a:gdLst>
-                <a:ahLst/>
-                <a:cxnLst>
-                  <a:cxn ang="0">
-                    <a:pos x="T0" y="T1"/>
-                  </a:cxn>
-                  <a:cxn ang="0">
-                    <a:pos x="T2" y="T3"/>
-                  </a:cxn>
-                  <a:cxn ang="0">
-                    <a:pos x="T4" y="T5"/>
-                  </a:cxn>
-                  <a:cxn ang="0">
-                    <a:pos x="T6" y="T7"/>
-                  </a:cxn>
-                  <a:cxn ang="0">
-                    <a:pos x="T8" y="T9"/>
-                  </a:cxn>
-                </a:cxnLst>
-                <a:rect l="0" t="0" r="r" b="b"/>
-                <a:pathLst>
-                  <a:path w="20" h="34">
-                    <a:moveTo>
-                      <a:pt x="11" y="34"/>
-                    </a:moveTo>
-                    <a:cubicBezTo>
-                      <a:pt x="20" y="34"/>
-                      <a:pt x="20" y="34"/>
-                      <a:pt x="20" y="34"/>
-                    </a:cubicBezTo>
-                    <a:cubicBezTo>
-                      <a:pt x="20" y="21"/>
-                      <a:pt x="15" y="10"/>
-                      <a:pt x="7" y="0"/>
-                    </a:cubicBezTo>
-                    <a:cubicBezTo>
-                      <a:pt x="0" y="7"/>
-                      <a:pt x="0" y="7"/>
-                      <a:pt x="0" y="7"/>
-                    </a:cubicBezTo>
-                    <a:cubicBezTo>
-                      <a:pt x="6" y="14"/>
-                      <a:pt x="10" y="24"/>
-                      <a:pt x="11" y="34"/>
-                    </a:cubicBezTo>
-                    <a:close/>
-                  </a:path>
-                </a:pathLst>
-              </a:custGeom>
-              <a:grpFill/>
-              <a:ln>
-                <a:noFill/>
-              </a:ln>
-              <a:extLst>
-                <a:ext uri="{91240B29-F687-4F45-9708-019B960494DF}">
-                  <a14:hiddenLine xmlns:a14="http://schemas.microsoft.com/office/drawing/2010/main" w="9525">
-                    <a:solidFill>
-                      <a:srgbClr val="000000"/>
-                    </a:solidFill>
-                    <a:round/>
-                    <a:headEnd/>
-                    <a:tailEnd/>
-                  </a14:hiddenLine>
-                </a:ext>
-              </a:extLst>
-            </p:spPr>
-            <p:txBody>
-              <a:bodyPr vert="horz" wrap="square" lIns="91440" tIns="45720" rIns="91440" bIns="45720" numCol="1" anchor="t" anchorCtr="0" compatLnSpc="1">
-                <a:prstTxWarp prst="textNoShape">
-                  <a:avLst/>
-                </a:prstTxWarp>
-              </a:bodyPr>
-              <a:lstStyle/>
-              <a:p>
-                <a:endParaRPr lang="zh-CN" altLang="en-US"/>
-              </a:p>
-            </p:txBody>
-          </p:sp>
-          <p:sp>
-            <p:nvSpPr>
-              <p:cNvPr id="208" name="Freeform 166">
-                <a:extLst>
-                  <a:ext uri="{FF2B5EF4-FFF2-40B4-BE49-F238E27FC236}">
-                    <a16:creationId xmlns:a16="http://schemas.microsoft.com/office/drawing/2014/main" id="{E055D978-5DA0-483A-87F9-4DDE5FD4A1D4}"/>
-                  </a:ext>
-                </a:extLst>
-              </p:cNvPr>
-              <p:cNvSpPr>
-                <a:spLocks/>
-              </p:cNvSpPr>
-              <p:nvPr/>
-            </p:nvSpPr>
-            <p:spPr bwMode="auto">
-              <a:xfrm>
-                <a:off x="5254105" y="3954920"/>
-                <a:ext cx="107038" cy="170849"/>
-              </a:xfrm>
-              <a:custGeom>
-                <a:avLst/>
-                <a:gdLst>
-                  <a:gd name="T0" fmla="*/ 10 w 22"/>
-                  <a:gd name="T1" fmla="*/ 0 h 35"/>
-                  <a:gd name="T2" fmla="*/ 0 w 22"/>
-                  <a:gd name="T3" fmla="*/ 0 h 35"/>
-                  <a:gd name="T4" fmla="*/ 15 w 22"/>
-                  <a:gd name="T5" fmla="*/ 35 h 35"/>
-                  <a:gd name="T6" fmla="*/ 22 w 22"/>
-                  <a:gd name="T7" fmla="*/ 28 h 35"/>
-                  <a:gd name="T8" fmla="*/ 10 w 22"/>
-                  <a:gd name="T9" fmla="*/ 0 h 35"/>
-                </a:gdLst>
-                <a:ahLst/>
-                <a:cxnLst>
-                  <a:cxn ang="0">
-                    <a:pos x="T0" y="T1"/>
-                  </a:cxn>
-                  <a:cxn ang="0">
-                    <a:pos x="T2" y="T3"/>
-                  </a:cxn>
-                  <a:cxn ang="0">
-                    <a:pos x="T4" y="T5"/>
-                  </a:cxn>
-                  <a:cxn ang="0">
-                    <a:pos x="T6" y="T7"/>
-                  </a:cxn>
-                  <a:cxn ang="0">
-                    <a:pos x="T8" y="T9"/>
-                  </a:cxn>
-                </a:cxnLst>
-                <a:rect l="0" t="0" r="r" b="b"/>
-                <a:pathLst>
-                  <a:path w="22" h="35">
-                    <a:moveTo>
-                      <a:pt x="10" y="0"/>
-                    </a:moveTo>
-                    <a:cubicBezTo>
-                      <a:pt x="0" y="0"/>
-                      <a:pt x="0" y="0"/>
-                      <a:pt x="0" y="0"/>
-                    </a:cubicBezTo>
-                    <a:cubicBezTo>
-                      <a:pt x="1" y="13"/>
-                      <a:pt x="7" y="25"/>
-                      <a:pt x="15" y="35"/>
-                    </a:cubicBezTo>
-                    <a:cubicBezTo>
-                      <a:pt x="22" y="28"/>
-                      <a:pt x="22" y="28"/>
-                      <a:pt x="22" y="28"/>
-                    </a:cubicBezTo>
-                    <a:cubicBezTo>
-                      <a:pt x="15" y="20"/>
-                      <a:pt x="11" y="11"/>
-                      <a:pt x="10" y="0"/>
-                    </a:cubicBezTo>
-                    <a:close/>
-                  </a:path>
-                </a:pathLst>
-              </a:custGeom>
-              <a:grpFill/>
-              <a:ln>
-                <a:noFill/>
-              </a:ln>
-              <a:extLst>
-                <a:ext uri="{91240B29-F687-4F45-9708-019B960494DF}">
-                  <a14:hiddenLine xmlns:a14="http://schemas.microsoft.com/office/drawing/2010/main" w="9525">
-                    <a:solidFill>
-                      <a:srgbClr val="000000"/>
-                    </a:solidFill>
-                    <a:round/>
-                    <a:headEnd/>
-                    <a:tailEnd/>
-                  </a14:hiddenLine>
-                </a:ext>
-              </a:extLst>
-            </p:spPr>
-            <p:txBody>
-              <a:bodyPr vert="horz" wrap="square" lIns="91440" tIns="45720" rIns="91440" bIns="45720" numCol="1" anchor="t" anchorCtr="0" compatLnSpc="1">
-                <a:prstTxWarp prst="textNoShape">
-                  <a:avLst/>
-                </a:prstTxWarp>
-              </a:bodyPr>
-              <a:lstStyle/>
-              <a:p>
-                <a:endParaRPr lang="zh-CN" altLang="en-US"/>
-              </a:p>
-            </p:txBody>
-          </p:sp>
-          <p:sp>
-            <p:nvSpPr>
-              <p:cNvPr id="209" name="Freeform 167">
-                <a:extLst>
-                  <a:ext uri="{FF2B5EF4-FFF2-40B4-BE49-F238E27FC236}">
-                    <a16:creationId xmlns:a16="http://schemas.microsoft.com/office/drawing/2014/main" id="{5117FF5E-CC8B-4E8D-BB83-6D493B849335}"/>
-                  </a:ext>
-                </a:extLst>
-              </p:cNvPr>
-              <p:cNvSpPr>
-                <a:spLocks/>
-              </p:cNvSpPr>
-              <p:nvPr/>
-            </p:nvSpPr>
-            <p:spPr bwMode="auto">
-              <a:xfrm>
-                <a:off x="5350851" y="4111360"/>
-                <a:ext cx="160557" cy="96746"/>
-              </a:xfrm>
-              <a:custGeom>
-                <a:avLst/>
-                <a:gdLst>
-                  <a:gd name="T0" fmla="*/ 0 w 33"/>
-                  <a:gd name="T1" fmla="*/ 7 h 20"/>
-                  <a:gd name="T2" fmla="*/ 33 w 33"/>
-                  <a:gd name="T3" fmla="*/ 20 h 20"/>
-                  <a:gd name="T4" fmla="*/ 33 w 33"/>
-                  <a:gd name="T5" fmla="*/ 11 h 20"/>
-                  <a:gd name="T6" fmla="*/ 6 w 33"/>
-                  <a:gd name="T7" fmla="*/ 0 h 20"/>
-                  <a:gd name="T8" fmla="*/ 0 w 33"/>
-                  <a:gd name="T9" fmla="*/ 7 h 20"/>
-                </a:gdLst>
-                <a:ahLst/>
-                <a:cxnLst>
-                  <a:cxn ang="0">
-                    <a:pos x="T0" y="T1"/>
-                  </a:cxn>
-                  <a:cxn ang="0">
-                    <a:pos x="T2" y="T3"/>
-                  </a:cxn>
-                  <a:cxn ang="0">
-                    <a:pos x="T4" y="T5"/>
-                  </a:cxn>
-                  <a:cxn ang="0">
-                    <a:pos x="T6" y="T7"/>
-                  </a:cxn>
-                  <a:cxn ang="0">
-                    <a:pos x="T8" y="T9"/>
-                  </a:cxn>
-                </a:cxnLst>
-                <a:rect l="0" t="0" r="r" b="b"/>
-                <a:pathLst>
-                  <a:path w="33" h="20">
-                    <a:moveTo>
-                      <a:pt x="0" y="7"/>
-                    </a:moveTo>
-                    <a:cubicBezTo>
-                      <a:pt x="9" y="15"/>
-                      <a:pt x="20" y="20"/>
-                      <a:pt x="33" y="20"/>
-                    </a:cubicBezTo>
-                    <a:cubicBezTo>
-                      <a:pt x="33" y="11"/>
-                      <a:pt x="33" y="11"/>
-                      <a:pt x="33" y="11"/>
-                    </a:cubicBezTo>
-                    <a:cubicBezTo>
-                      <a:pt x="23" y="10"/>
-                      <a:pt x="14" y="6"/>
-                      <a:pt x="6" y="0"/>
-                    </a:cubicBezTo>
-                    <a:lnTo>
-                      <a:pt x="0" y="7"/>
-                    </a:lnTo>
-                    <a:close/>
-                  </a:path>
-                </a:pathLst>
-              </a:custGeom>
-              <a:grpFill/>
-              <a:ln>
-                <a:noFill/>
-              </a:ln>
-              <a:extLst>
-                <a:ext uri="{91240B29-F687-4F45-9708-019B960494DF}">
-                  <a14:hiddenLine xmlns:a14="http://schemas.microsoft.com/office/drawing/2010/main" w="9525">
-                    <a:solidFill>
-                      <a:srgbClr val="000000"/>
-                    </a:solidFill>
-                    <a:round/>
-                    <a:headEnd/>
-                    <a:tailEnd/>
-                  </a14:hiddenLine>
-                </a:ext>
-              </a:extLst>
-            </p:spPr>
-            <p:txBody>
-              <a:bodyPr vert="horz" wrap="square" lIns="91440" tIns="45720" rIns="91440" bIns="45720" numCol="1" anchor="t" anchorCtr="0" compatLnSpc="1">
-                <a:prstTxWarp prst="textNoShape">
-                  <a:avLst/>
-                </a:prstTxWarp>
-              </a:bodyPr>
-              <a:lstStyle/>
-              <a:p>
-                <a:endParaRPr lang="zh-CN" altLang="en-US"/>
-              </a:p>
-            </p:txBody>
-          </p:sp>
-          <p:sp>
-            <p:nvSpPr>
-              <p:cNvPr id="210" name="Freeform 168">
-                <a:extLst>
-                  <a:ext uri="{FF2B5EF4-FFF2-40B4-BE49-F238E27FC236}">
-                    <a16:creationId xmlns:a16="http://schemas.microsoft.com/office/drawing/2014/main" id="{8096EB02-C835-4652-A5DD-75430A320108}"/>
-                  </a:ext>
-                </a:extLst>
-              </p:cNvPr>
-              <p:cNvSpPr>
-                <a:spLocks/>
-              </p:cNvSpPr>
-              <p:nvPr/>
-            </p:nvSpPr>
-            <p:spPr bwMode="auto">
-              <a:xfrm>
-                <a:off x="5254105" y="3763487"/>
-                <a:ext cx="96746" cy="162615"/>
-              </a:xfrm>
-              <a:custGeom>
-                <a:avLst/>
-                <a:gdLst>
-                  <a:gd name="T0" fmla="*/ 20 w 20"/>
-                  <a:gd name="T1" fmla="*/ 7 h 33"/>
-                  <a:gd name="T2" fmla="*/ 13 w 20"/>
-                  <a:gd name="T3" fmla="*/ 0 h 33"/>
-                  <a:gd name="T4" fmla="*/ 0 w 20"/>
-                  <a:gd name="T5" fmla="*/ 33 h 33"/>
-                  <a:gd name="T6" fmla="*/ 10 w 20"/>
-                  <a:gd name="T7" fmla="*/ 33 h 33"/>
-                  <a:gd name="T8" fmla="*/ 20 w 20"/>
-                  <a:gd name="T9" fmla="*/ 7 h 33"/>
-                </a:gdLst>
-                <a:ahLst/>
-                <a:cxnLst>
-                  <a:cxn ang="0">
-                    <a:pos x="T0" y="T1"/>
-                  </a:cxn>
-                  <a:cxn ang="0">
-                    <a:pos x="T2" y="T3"/>
-                  </a:cxn>
-                  <a:cxn ang="0">
-                    <a:pos x="T4" y="T5"/>
-                  </a:cxn>
-                  <a:cxn ang="0">
-                    <a:pos x="T6" y="T7"/>
-                  </a:cxn>
-                  <a:cxn ang="0">
-                    <a:pos x="T8" y="T9"/>
-                  </a:cxn>
-                </a:cxnLst>
-                <a:rect l="0" t="0" r="r" b="b"/>
-                <a:pathLst>
-                  <a:path w="20" h="33">
-                    <a:moveTo>
-                      <a:pt x="20" y="7"/>
-                    </a:moveTo>
-                    <a:cubicBezTo>
-                      <a:pt x="13" y="0"/>
-                      <a:pt x="13" y="0"/>
-                      <a:pt x="13" y="0"/>
-                    </a:cubicBezTo>
-                    <a:cubicBezTo>
-                      <a:pt x="6" y="9"/>
-                      <a:pt x="1" y="21"/>
-                      <a:pt x="0" y="33"/>
-                    </a:cubicBezTo>
-                    <a:cubicBezTo>
-                      <a:pt x="10" y="33"/>
-                      <a:pt x="10" y="33"/>
-                      <a:pt x="10" y="33"/>
-                    </a:cubicBezTo>
-                    <a:cubicBezTo>
-                      <a:pt x="11" y="23"/>
-                      <a:pt x="14" y="14"/>
-                      <a:pt x="20" y="7"/>
-                    </a:cubicBezTo>
-                    <a:close/>
-                  </a:path>
-                </a:pathLst>
-              </a:custGeom>
-              <a:grpFill/>
-              <a:ln>
-                <a:noFill/>
-              </a:ln>
-              <a:extLst>
-                <a:ext uri="{91240B29-F687-4F45-9708-019B960494DF}">
-                  <a14:hiddenLine xmlns:a14="http://schemas.microsoft.com/office/drawing/2010/main" w="9525">
-                    <a:solidFill>
-                      <a:srgbClr val="000000"/>
-                    </a:solidFill>
-                    <a:round/>
-                    <a:headEnd/>
-                    <a:tailEnd/>
-                  </a14:hiddenLine>
-                </a:ext>
-              </a:extLst>
-            </p:spPr>
-            <p:txBody>
-              <a:bodyPr vert="horz" wrap="square" lIns="91440" tIns="45720" rIns="91440" bIns="45720" numCol="1" anchor="t" anchorCtr="0" compatLnSpc="1">
-                <a:prstTxWarp prst="textNoShape">
-                  <a:avLst/>
-                </a:prstTxWarp>
-              </a:bodyPr>
-              <a:lstStyle/>
-              <a:p>
-                <a:endParaRPr lang="zh-CN" altLang="en-US"/>
-              </a:p>
-            </p:txBody>
-          </p:sp>
-          <p:sp>
-            <p:nvSpPr>
-              <p:cNvPr id="211" name="Freeform 169">
-                <a:extLst>
-                  <a:ext uri="{FF2B5EF4-FFF2-40B4-BE49-F238E27FC236}">
-                    <a16:creationId xmlns:a16="http://schemas.microsoft.com/office/drawing/2014/main" id="{BE6C6622-5B44-4962-AF4D-29AAFA4D5B5B}"/>
-                  </a:ext>
-                </a:extLst>
-              </p:cNvPr>
-              <p:cNvSpPr>
-                <a:spLocks/>
-              </p:cNvSpPr>
-              <p:nvPr/>
-            </p:nvSpPr>
-            <p:spPr bwMode="auto">
-              <a:xfrm>
-                <a:off x="5336442" y="3666741"/>
-                <a:ext cx="174966" cy="111155"/>
-              </a:xfrm>
-              <a:custGeom>
-                <a:avLst/>
-                <a:gdLst>
-                  <a:gd name="T0" fmla="*/ 7 w 36"/>
-                  <a:gd name="T1" fmla="*/ 23 h 23"/>
-                  <a:gd name="T2" fmla="*/ 36 w 36"/>
-                  <a:gd name="T3" fmla="*/ 10 h 23"/>
-                  <a:gd name="T4" fmla="*/ 36 w 36"/>
-                  <a:gd name="T5" fmla="*/ 0 h 23"/>
-                  <a:gd name="T6" fmla="*/ 0 w 36"/>
-                  <a:gd name="T7" fmla="*/ 16 h 23"/>
-                  <a:gd name="T8" fmla="*/ 7 w 36"/>
-                  <a:gd name="T9" fmla="*/ 23 h 23"/>
-                </a:gdLst>
-                <a:ahLst/>
-                <a:cxnLst>
-                  <a:cxn ang="0">
-                    <a:pos x="T0" y="T1"/>
-                  </a:cxn>
-                  <a:cxn ang="0">
-                    <a:pos x="T2" y="T3"/>
-                  </a:cxn>
-                  <a:cxn ang="0">
-                    <a:pos x="T4" y="T5"/>
-                  </a:cxn>
-                  <a:cxn ang="0">
-                    <a:pos x="T6" y="T7"/>
-                  </a:cxn>
-                  <a:cxn ang="0">
-                    <a:pos x="T8" y="T9"/>
-                  </a:cxn>
-                </a:cxnLst>
-                <a:rect l="0" t="0" r="r" b="b"/>
-                <a:pathLst>
-                  <a:path w="36" h="23">
-                    <a:moveTo>
-                      <a:pt x="7" y="23"/>
-                    </a:moveTo>
-                    <a:cubicBezTo>
-                      <a:pt x="14" y="15"/>
-                      <a:pt x="25" y="11"/>
-                      <a:pt x="36" y="10"/>
-                    </a:cubicBezTo>
-                    <a:cubicBezTo>
-                      <a:pt x="36" y="0"/>
-                      <a:pt x="36" y="0"/>
-                      <a:pt x="36" y="0"/>
-                    </a:cubicBezTo>
-                    <a:cubicBezTo>
-                      <a:pt x="22" y="1"/>
-                      <a:pt x="9" y="7"/>
-                      <a:pt x="0" y="16"/>
-                    </a:cubicBezTo>
-                    <a:lnTo>
-                      <a:pt x="7" y="23"/>
-                    </a:lnTo>
-                    <a:close/>
-                  </a:path>
-                </a:pathLst>
-              </a:custGeom>
-              <a:grpFill/>
-              <a:ln>
-                <a:noFill/>
-              </a:ln>
-              <a:extLst>
-                <a:ext uri="{91240B29-F687-4F45-9708-019B960494DF}">
-                  <a14:hiddenLine xmlns:a14="http://schemas.microsoft.com/office/drawing/2010/main" w="9525">
-                    <a:solidFill>
-                      <a:srgbClr val="000000"/>
-                    </a:solidFill>
-                    <a:round/>
-                    <a:headEnd/>
-                    <a:tailEnd/>
-                  </a14:hiddenLine>
-                </a:ext>
-              </a:extLst>
-            </p:spPr>
-            <p:txBody>
-              <a:bodyPr vert="horz" wrap="square" lIns="91440" tIns="45720" rIns="91440" bIns="45720" numCol="1" anchor="t" anchorCtr="0" compatLnSpc="1">
-                <a:prstTxWarp prst="textNoShape">
-                  <a:avLst/>
-                </a:prstTxWarp>
-              </a:bodyPr>
-              <a:lstStyle/>
-              <a:p>
-                <a:endParaRPr lang="zh-CN" altLang="en-US"/>
-              </a:p>
-            </p:txBody>
-          </p:sp>
-        </p:grpSp>
+              </a:prstTxWarp>
+            </a:bodyPr>
+            <a:lstStyle/>
+            <a:p>
+              <a:endParaRPr lang="zh-CN" altLang="en-US"/>
+            </a:p>
+          </p:txBody>
+        </p:sp>
         <p:sp>
           <p:nvSpPr>
-            <p:cNvPr id="213" name="文本框 212">
+            <p:cNvPr id="206" name="Freeform 164">
               <a:extLst>
                 <a:ext uri="{FF2B5EF4-FFF2-40B4-BE49-F238E27FC236}">
-                  <a16:creationId xmlns:a16="http://schemas.microsoft.com/office/drawing/2014/main" id="{9BDA39A2-5BA1-4E04-88C9-EBD1496C420A}"/>
+                  <a16:creationId xmlns:a16="http://schemas.microsoft.com/office/drawing/2014/main" id="{C8C987D1-E956-43FF-89A7-9E8104612F3C}"/>
                 </a:ext>
               </a:extLst>
             </p:cNvPr>
-            <p:cNvSpPr txBox="1"/>
+            <p:cNvSpPr>
+              <a:spLocks/>
+            </p:cNvSpPr>
             <p:nvPr/>
           </p:nvSpPr>
-          <p:spPr>
+          <p:spPr bwMode="auto">
             <a:xfrm>
-              <a:off x="1893163" y="1882411"/>
-              <a:ext cx="217363" cy="246221"/>
+              <a:off x="5542285" y="3666741"/>
+              <a:ext cx="168791" cy="107038"/>
             </a:xfrm>
-            <a:prstGeom prst="rect">
+            <a:custGeom>
               <a:avLst/>
-            </a:prstGeom>
-            <a:noFill/>
+              <a:gdLst>
+                <a:gd name="T0" fmla="*/ 35 w 35"/>
+                <a:gd name="T1" fmla="*/ 15 h 22"/>
+                <a:gd name="T2" fmla="*/ 0 w 35"/>
+                <a:gd name="T3" fmla="*/ 0 h 22"/>
+                <a:gd name="T4" fmla="*/ 0 w 35"/>
+                <a:gd name="T5" fmla="*/ 10 h 22"/>
+                <a:gd name="T6" fmla="*/ 28 w 35"/>
+                <a:gd name="T7" fmla="*/ 22 h 22"/>
+                <a:gd name="T8" fmla="*/ 35 w 35"/>
+                <a:gd name="T9" fmla="*/ 15 h 22"/>
+              </a:gdLst>
+              <a:ahLst/>
+              <a:cxnLst>
+                <a:cxn ang="0">
+                  <a:pos x="T0" y="T1"/>
+                </a:cxn>
+                <a:cxn ang="0">
+                  <a:pos x="T2" y="T3"/>
+                </a:cxn>
+                <a:cxn ang="0">
+                  <a:pos x="T4" y="T5"/>
+                </a:cxn>
+                <a:cxn ang="0">
+                  <a:pos x="T6" y="T7"/>
+                </a:cxn>
+                <a:cxn ang="0">
+                  <a:pos x="T8" y="T9"/>
+                </a:cxn>
+              </a:cxnLst>
+              <a:rect l="0" t="0" r="r" b="b"/>
+              <a:pathLst>
+                <a:path w="35" h="22">
+                  <a:moveTo>
+                    <a:pt x="35" y="15"/>
+                  </a:moveTo>
+                  <a:cubicBezTo>
+                    <a:pt x="26" y="7"/>
+                    <a:pt x="13" y="1"/>
+                    <a:pt x="0" y="0"/>
+                  </a:cubicBezTo>
+                  <a:cubicBezTo>
+                    <a:pt x="0" y="10"/>
+                    <a:pt x="0" y="10"/>
+                    <a:pt x="0" y="10"/>
+                  </a:cubicBezTo>
+                  <a:cubicBezTo>
+                    <a:pt x="11" y="11"/>
+                    <a:pt x="21" y="15"/>
+                    <a:pt x="28" y="22"/>
+                  </a:cubicBezTo>
+                  <a:lnTo>
+                    <a:pt x="35" y="15"/>
+                  </a:lnTo>
+                  <a:close/>
+                </a:path>
+              </a:pathLst>
+            </a:custGeom>
+            <a:grpFill/>
+            <a:ln>
+              <a:noFill/>
+            </a:ln>
+            <a:extLst>
+              <a:ext uri="{91240B29-F687-4F45-9708-019B960494DF}">
+                <a14:hiddenLine xmlns:a14="http://schemas.microsoft.com/office/drawing/2010/main" w="9525">
+                  <a:solidFill>
+                    <a:srgbClr val="000000"/>
+                  </a:solidFill>
+                  <a:round/>
+                  <a:headEnd/>
+                  <a:tailEnd/>
+                </a14:hiddenLine>
+              </a:ext>
+            </a:extLst>
           </p:spPr>
           <p:txBody>
-            <a:bodyPr wrap="square" rtlCol="0">
-              <a:spAutoFit/>
+            <a:bodyPr vert="horz" wrap="square" lIns="91440" tIns="45720" rIns="91440" bIns="45720" numCol="1" anchor="t" anchorCtr="0" compatLnSpc="1">
+              <a:prstTxWarp prst="textNoShape">
+                <a:avLst/>
+              </a:prstTxWarp>
             </a:bodyPr>
             <a:lstStyle/>
             <a:p>
-              <a:r>
-                <a:rPr lang="en-US" altLang="zh-CN" sz="1000" b="1" dirty="0">
+              <a:endParaRPr lang="zh-CN" altLang="en-US"/>
+            </a:p>
+          </p:txBody>
+        </p:sp>
+        <p:sp>
+          <p:nvSpPr>
+            <p:cNvPr id="207" name="Freeform 165">
+              <a:extLst>
+                <a:ext uri="{FF2B5EF4-FFF2-40B4-BE49-F238E27FC236}">
+                  <a16:creationId xmlns:a16="http://schemas.microsoft.com/office/drawing/2014/main" id="{B072F521-B2D2-425A-BD84-824A8E9ED90C}"/>
+                </a:ext>
+              </a:extLst>
+            </p:cNvPr>
+            <p:cNvSpPr>
+              <a:spLocks/>
+            </p:cNvSpPr>
+            <p:nvPr/>
+          </p:nvSpPr>
+          <p:spPr bwMode="auto">
+            <a:xfrm>
+              <a:off x="5696666" y="3759370"/>
+              <a:ext cx="98804" cy="166732"/>
+            </a:xfrm>
+            <a:custGeom>
+              <a:avLst/>
+              <a:gdLst>
+                <a:gd name="T0" fmla="*/ 11 w 20"/>
+                <a:gd name="T1" fmla="*/ 34 h 34"/>
+                <a:gd name="T2" fmla="*/ 20 w 20"/>
+                <a:gd name="T3" fmla="*/ 34 h 34"/>
+                <a:gd name="T4" fmla="*/ 7 w 20"/>
+                <a:gd name="T5" fmla="*/ 0 h 34"/>
+                <a:gd name="T6" fmla="*/ 0 w 20"/>
+                <a:gd name="T7" fmla="*/ 7 h 34"/>
+                <a:gd name="T8" fmla="*/ 11 w 20"/>
+                <a:gd name="T9" fmla="*/ 34 h 34"/>
+              </a:gdLst>
+              <a:ahLst/>
+              <a:cxnLst>
+                <a:cxn ang="0">
+                  <a:pos x="T0" y="T1"/>
+                </a:cxn>
+                <a:cxn ang="0">
+                  <a:pos x="T2" y="T3"/>
+                </a:cxn>
+                <a:cxn ang="0">
+                  <a:pos x="T4" y="T5"/>
+                </a:cxn>
+                <a:cxn ang="0">
+                  <a:pos x="T6" y="T7"/>
+                </a:cxn>
+                <a:cxn ang="0">
+                  <a:pos x="T8" y="T9"/>
+                </a:cxn>
+              </a:cxnLst>
+              <a:rect l="0" t="0" r="r" b="b"/>
+              <a:pathLst>
+                <a:path w="20" h="34">
+                  <a:moveTo>
+                    <a:pt x="11" y="34"/>
+                  </a:moveTo>
+                  <a:cubicBezTo>
+                    <a:pt x="20" y="34"/>
+                    <a:pt x="20" y="34"/>
+                    <a:pt x="20" y="34"/>
+                  </a:cubicBezTo>
+                  <a:cubicBezTo>
+                    <a:pt x="20" y="21"/>
+                    <a:pt x="15" y="10"/>
+                    <a:pt x="7" y="0"/>
+                  </a:cubicBezTo>
+                  <a:cubicBezTo>
+                    <a:pt x="0" y="7"/>
+                    <a:pt x="0" y="7"/>
+                    <a:pt x="0" y="7"/>
+                  </a:cubicBezTo>
+                  <a:cubicBezTo>
+                    <a:pt x="6" y="14"/>
+                    <a:pt x="10" y="24"/>
+                    <a:pt x="11" y="34"/>
+                  </a:cubicBezTo>
+                  <a:close/>
+                </a:path>
+              </a:pathLst>
+            </a:custGeom>
+            <a:grpFill/>
+            <a:ln>
+              <a:noFill/>
+            </a:ln>
+            <a:extLst>
+              <a:ext uri="{91240B29-F687-4F45-9708-019B960494DF}">
+                <a14:hiddenLine xmlns:a14="http://schemas.microsoft.com/office/drawing/2010/main" w="9525">
                   <a:solidFill>
-                    <a:srgbClr val="00B0F0"/>
+                    <a:srgbClr val="000000"/>
                   </a:solidFill>
-                  <a:latin typeface="Aldrich" panose="02000000000000000000" pitchFamily="2" charset="0"/>
-                </a:rPr>
-                <a:t>2</a:t>
-              </a:r>
-              <a:endParaRPr lang="zh-CN" altLang="en-US" sz="1000" b="1" dirty="0">
+                  <a:round/>
+                  <a:headEnd/>
+                  <a:tailEnd/>
+                </a14:hiddenLine>
+              </a:ext>
+            </a:extLst>
+          </p:spPr>
+          <p:txBody>
+            <a:bodyPr vert="horz" wrap="square" lIns="91440" tIns="45720" rIns="91440" bIns="45720" numCol="1" anchor="t" anchorCtr="0" compatLnSpc="1">
+              <a:prstTxWarp prst="textNoShape">
+                <a:avLst/>
+              </a:prstTxWarp>
+            </a:bodyPr>
+            <a:lstStyle/>
+            <a:p>
+              <a:endParaRPr lang="zh-CN" altLang="en-US"/>
+            </a:p>
+          </p:txBody>
+        </p:sp>
+        <p:sp>
+          <p:nvSpPr>
+            <p:cNvPr id="208" name="Freeform 166">
+              <a:extLst>
+                <a:ext uri="{FF2B5EF4-FFF2-40B4-BE49-F238E27FC236}">
+                  <a16:creationId xmlns:a16="http://schemas.microsoft.com/office/drawing/2014/main" id="{E055D978-5DA0-483A-87F9-4DDE5FD4A1D4}"/>
+                </a:ext>
+              </a:extLst>
+            </p:cNvPr>
+            <p:cNvSpPr>
+              <a:spLocks/>
+            </p:cNvSpPr>
+            <p:nvPr/>
+          </p:nvSpPr>
+          <p:spPr bwMode="auto">
+            <a:xfrm>
+              <a:off x="5254105" y="3954920"/>
+              <a:ext cx="107038" cy="170849"/>
+            </a:xfrm>
+            <a:custGeom>
+              <a:avLst/>
+              <a:gdLst>
+                <a:gd name="T0" fmla="*/ 10 w 22"/>
+                <a:gd name="T1" fmla="*/ 0 h 35"/>
+                <a:gd name="T2" fmla="*/ 0 w 22"/>
+                <a:gd name="T3" fmla="*/ 0 h 35"/>
+                <a:gd name="T4" fmla="*/ 15 w 22"/>
+                <a:gd name="T5" fmla="*/ 35 h 35"/>
+                <a:gd name="T6" fmla="*/ 22 w 22"/>
+                <a:gd name="T7" fmla="*/ 28 h 35"/>
+                <a:gd name="T8" fmla="*/ 10 w 22"/>
+                <a:gd name="T9" fmla="*/ 0 h 35"/>
+              </a:gdLst>
+              <a:ahLst/>
+              <a:cxnLst>
+                <a:cxn ang="0">
+                  <a:pos x="T0" y="T1"/>
+                </a:cxn>
+                <a:cxn ang="0">
+                  <a:pos x="T2" y="T3"/>
+                </a:cxn>
+                <a:cxn ang="0">
+                  <a:pos x="T4" y="T5"/>
+                </a:cxn>
+                <a:cxn ang="0">
+                  <a:pos x="T6" y="T7"/>
+                </a:cxn>
+                <a:cxn ang="0">
+                  <a:pos x="T8" y="T9"/>
+                </a:cxn>
+              </a:cxnLst>
+              <a:rect l="0" t="0" r="r" b="b"/>
+              <a:pathLst>
+                <a:path w="22" h="35">
+                  <a:moveTo>
+                    <a:pt x="10" y="0"/>
+                  </a:moveTo>
+                  <a:cubicBezTo>
+                    <a:pt x="0" y="0"/>
+                    <a:pt x="0" y="0"/>
+                    <a:pt x="0" y="0"/>
+                  </a:cubicBezTo>
+                  <a:cubicBezTo>
+                    <a:pt x="1" y="13"/>
+                    <a:pt x="7" y="25"/>
+                    <a:pt x="15" y="35"/>
+                  </a:cubicBezTo>
+                  <a:cubicBezTo>
+                    <a:pt x="22" y="28"/>
+                    <a:pt x="22" y="28"/>
+                    <a:pt x="22" y="28"/>
+                  </a:cubicBezTo>
+                  <a:cubicBezTo>
+                    <a:pt x="15" y="20"/>
+                    <a:pt x="11" y="11"/>
+                    <a:pt x="10" y="0"/>
+                  </a:cubicBezTo>
+                  <a:close/>
+                </a:path>
+              </a:pathLst>
+            </a:custGeom>
+            <a:grpFill/>
+            <a:ln>
+              <a:noFill/>
+            </a:ln>
+            <a:extLst>
+              <a:ext uri="{91240B29-F687-4F45-9708-019B960494DF}">
+                <a14:hiddenLine xmlns:a14="http://schemas.microsoft.com/office/drawing/2010/main" w="9525">
+                  <a:solidFill>
+                    <a:srgbClr val="000000"/>
+                  </a:solidFill>
+                  <a:round/>
+                  <a:headEnd/>
+                  <a:tailEnd/>
+                </a14:hiddenLine>
+              </a:ext>
+            </a:extLst>
+          </p:spPr>
+          <p:txBody>
+            <a:bodyPr vert="horz" wrap="square" lIns="91440" tIns="45720" rIns="91440" bIns="45720" numCol="1" anchor="t" anchorCtr="0" compatLnSpc="1">
+              <a:prstTxWarp prst="textNoShape">
+                <a:avLst/>
+              </a:prstTxWarp>
+            </a:bodyPr>
+            <a:lstStyle/>
+            <a:p>
+              <a:endParaRPr lang="zh-CN" altLang="en-US"/>
+            </a:p>
+          </p:txBody>
+        </p:sp>
+        <p:sp>
+          <p:nvSpPr>
+            <p:cNvPr id="209" name="Freeform 167">
+              <a:extLst>
+                <a:ext uri="{FF2B5EF4-FFF2-40B4-BE49-F238E27FC236}">
+                  <a16:creationId xmlns:a16="http://schemas.microsoft.com/office/drawing/2014/main" id="{5117FF5E-CC8B-4E8D-BB83-6D493B849335}"/>
+                </a:ext>
+              </a:extLst>
+            </p:cNvPr>
+            <p:cNvSpPr>
+              <a:spLocks/>
+            </p:cNvSpPr>
+            <p:nvPr/>
+          </p:nvSpPr>
+          <p:spPr bwMode="auto">
+            <a:xfrm>
+              <a:off x="5350851" y="4111360"/>
+              <a:ext cx="160557" cy="96746"/>
+            </a:xfrm>
+            <a:custGeom>
+              <a:avLst/>
+              <a:gdLst>
+                <a:gd name="T0" fmla="*/ 0 w 33"/>
+                <a:gd name="T1" fmla="*/ 7 h 20"/>
+                <a:gd name="T2" fmla="*/ 33 w 33"/>
+                <a:gd name="T3" fmla="*/ 20 h 20"/>
+                <a:gd name="T4" fmla="*/ 33 w 33"/>
+                <a:gd name="T5" fmla="*/ 11 h 20"/>
+                <a:gd name="T6" fmla="*/ 6 w 33"/>
+                <a:gd name="T7" fmla="*/ 0 h 20"/>
+                <a:gd name="T8" fmla="*/ 0 w 33"/>
+                <a:gd name="T9" fmla="*/ 7 h 20"/>
+              </a:gdLst>
+              <a:ahLst/>
+              <a:cxnLst>
+                <a:cxn ang="0">
+                  <a:pos x="T0" y="T1"/>
+                </a:cxn>
+                <a:cxn ang="0">
+                  <a:pos x="T2" y="T3"/>
+                </a:cxn>
+                <a:cxn ang="0">
+                  <a:pos x="T4" y="T5"/>
+                </a:cxn>
+                <a:cxn ang="0">
+                  <a:pos x="T6" y="T7"/>
+                </a:cxn>
+                <a:cxn ang="0">
+                  <a:pos x="T8" y="T9"/>
+                </a:cxn>
+              </a:cxnLst>
+              <a:rect l="0" t="0" r="r" b="b"/>
+              <a:pathLst>
+                <a:path w="33" h="20">
+                  <a:moveTo>
+                    <a:pt x="0" y="7"/>
+                  </a:moveTo>
+                  <a:cubicBezTo>
+                    <a:pt x="9" y="15"/>
+                    <a:pt x="20" y="20"/>
+                    <a:pt x="33" y="20"/>
+                  </a:cubicBezTo>
+                  <a:cubicBezTo>
+                    <a:pt x="33" y="11"/>
+                    <a:pt x="33" y="11"/>
+                    <a:pt x="33" y="11"/>
+                  </a:cubicBezTo>
+                  <a:cubicBezTo>
+                    <a:pt x="23" y="10"/>
+                    <a:pt x="14" y="6"/>
+                    <a:pt x="6" y="0"/>
+                  </a:cubicBezTo>
+                  <a:lnTo>
+                    <a:pt x="0" y="7"/>
+                  </a:lnTo>
+                  <a:close/>
+                </a:path>
+              </a:pathLst>
+            </a:custGeom>
+            <a:grpFill/>
+            <a:ln>
+              <a:noFill/>
+            </a:ln>
+            <a:extLst>
+              <a:ext uri="{91240B29-F687-4F45-9708-019B960494DF}">
+                <a14:hiddenLine xmlns:a14="http://schemas.microsoft.com/office/drawing/2010/main" w="9525">
+                  <a:solidFill>
+                    <a:srgbClr val="000000"/>
+                  </a:solidFill>
+                  <a:round/>
+                  <a:headEnd/>
+                  <a:tailEnd/>
+                </a14:hiddenLine>
+              </a:ext>
+            </a:extLst>
+          </p:spPr>
+          <p:txBody>
+            <a:bodyPr vert="horz" wrap="square" lIns="91440" tIns="45720" rIns="91440" bIns="45720" numCol="1" anchor="t" anchorCtr="0" compatLnSpc="1">
+              <a:prstTxWarp prst="textNoShape">
+                <a:avLst/>
+              </a:prstTxWarp>
+            </a:bodyPr>
+            <a:lstStyle/>
+            <a:p>
+              <a:endParaRPr lang="zh-CN" altLang="en-US"/>
+            </a:p>
+          </p:txBody>
+        </p:sp>
+        <p:sp>
+          <p:nvSpPr>
+            <p:cNvPr id="210" name="Freeform 168">
+              <a:extLst>
+                <a:ext uri="{FF2B5EF4-FFF2-40B4-BE49-F238E27FC236}">
+                  <a16:creationId xmlns:a16="http://schemas.microsoft.com/office/drawing/2014/main" id="{8096EB02-C835-4652-A5DD-75430A320108}"/>
+                </a:ext>
+              </a:extLst>
+            </p:cNvPr>
+            <p:cNvSpPr>
+              <a:spLocks/>
+            </p:cNvSpPr>
+            <p:nvPr/>
+          </p:nvSpPr>
+          <p:spPr bwMode="auto">
+            <a:xfrm>
+              <a:off x="5254105" y="3763487"/>
+              <a:ext cx="96746" cy="162615"/>
+            </a:xfrm>
+            <a:custGeom>
+              <a:avLst/>
+              <a:gdLst>
+                <a:gd name="T0" fmla="*/ 20 w 20"/>
+                <a:gd name="T1" fmla="*/ 7 h 33"/>
+                <a:gd name="T2" fmla="*/ 13 w 20"/>
+                <a:gd name="T3" fmla="*/ 0 h 33"/>
+                <a:gd name="T4" fmla="*/ 0 w 20"/>
+                <a:gd name="T5" fmla="*/ 33 h 33"/>
+                <a:gd name="T6" fmla="*/ 10 w 20"/>
+                <a:gd name="T7" fmla="*/ 33 h 33"/>
+                <a:gd name="T8" fmla="*/ 20 w 20"/>
+                <a:gd name="T9" fmla="*/ 7 h 33"/>
+              </a:gdLst>
+              <a:ahLst/>
+              <a:cxnLst>
+                <a:cxn ang="0">
+                  <a:pos x="T0" y="T1"/>
+                </a:cxn>
+                <a:cxn ang="0">
+                  <a:pos x="T2" y="T3"/>
+                </a:cxn>
+                <a:cxn ang="0">
+                  <a:pos x="T4" y="T5"/>
+                </a:cxn>
+                <a:cxn ang="0">
+                  <a:pos x="T6" y="T7"/>
+                </a:cxn>
+                <a:cxn ang="0">
+                  <a:pos x="T8" y="T9"/>
+                </a:cxn>
+              </a:cxnLst>
+              <a:rect l="0" t="0" r="r" b="b"/>
+              <a:pathLst>
+                <a:path w="20" h="33">
+                  <a:moveTo>
+                    <a:pt x="20" y="7"/>
+                  </a:moveTo>
+                  <a:cubicBezTo>
+                    <a:pt x="13" y="0"/>
+                    <a:pt x="13" y="0"/>
+                    <a:pt x="13" y="0"/>
+                  </a:cubicBezTo>
+                  <a:cubicBezTo>
+                    <a:pt x="6" y="9"/>
+                    <a:pt x="1" y="21"/>
+                    <a:pt x="0" y="33"/>
+                  </a:cubicBezTo>
+                  <a:cubicBezTo>
+                    <a:pt x="10" y="33"/>
+                    <a:pt x="10" y="33"/>
+                    <a:pt x="10" y="33"/>
+                  </a:cubicBezTo>
+                  <a:cubicBezTo>
+                    <a:pt x="11" y="23"/>
+                    <a:pt x="14" y="14"/>
+                    <a:pt x="20" y="7"/>
+                  </a:cubicBezTo>
+                  <a:close/>
+                </a:path>
+              </a:pathLst>
+            </a:custGeom>
+            <a:grpFill/>
+            <a:ln>
+              <a:noFill/>
+            </a:ln>
+            <a:extLst>
+              <a:ext uri="{91240B29-F687-4F45-9708-019B960494DF}">
+                <a14:hiddenLine xmlns:a14="http://schemas.microsoft.com/office/drawing/2010/main" w="9525">
+                  <a:solidFill>
+                    <a:srgbClr val="000000"/>
+                  </a:solidFill>
+                  <a:round/>
+                  <a:headEnd/>
+                  <a:tailEnd/>
+                </a14:hiddenLine>
+              </a:ext>
+            </a:extLst>
+          </p:spPr>
+          <p:txBody>
+            <a:bodyPr vert="horz" wrap="square" lIns="91440" tIns="45720" rIns="91440" bIns="45720" numCol="1" anchor="t" anchorCtr="0" compatLnSpc="1">
+              <a:prstTxWarp prst="textNoShape">
+                <a:avLst/>
+              </a:prstTxWarp>
+            </a:bodyPr>
+            <a:lstStyle/>
+            <a:p>
+              <a:endParaRPr lang="zh-CN" altLang="en-US"/>
+            </a:p>
+          </p:txBody>
+        </p:sp>
+        <p:sp>
+          <p:nvSpPr>
+            <p:cNvPr id="211" name="Freeform 169">
+              <a:extLst>
+                <a:ext uri="{FF2B5EF4-FFF2-40B4-BE49-F238E27FC236}">
+                  <a16:creationId xmlns:a16="http://schemas.microsoft.com/office/drawing/2014/main" id="{BE6C6622-5B44-4962-AF4D-29AAFA4D5B5B}"/>
+                </a:ext>
+              </a:extLst>
+            </p:cNvPr>
+            <p:cNvSpPr>
+              <a:spLocks/>
+            </p:cNvSpPr>
+            <p:nvPr/>
+          </p:nvSpPr>
+          <p:spPr bwMode="auto">
+            <a:xfrm>
+              <a:off x="5336442" y="3666741"/>
+              <a:ext cx="174966" cy="111155"/>
+            </a:xfrm>
+            <a:custGeom>
+              <a:avLst/>
+              <a:gdLst>
+                <a:gd name="T0" fmla="*/ 7 w 36"/>
+                <a:gd name="T1" fmla="*/ 23 h 23"/>
+                <a:gd name="T2" fmla="*/ 36 w 36"/>
+                <a:gd name="T3" fmla="*/ 10 h 23"/>
+                <a:gd name="T4" fmla="*/ 36 w 36"/>
+                <a:gd name="T5" fmla="*/ 0 h 23"/>
+                <a:gd name="T6" fmla="*/ 0 w 36"/>
+                <a:gd name="T7" fmla="*/ 16 h 23"/>
+                <a:gd name="T8" fmla="*/ 7 w 36"/>
+                <a:gd name="T9" fmla="*/ 23 h 23"/>
+              </a:gdLst>
+              <a:ahLst/>
+              <a:cxnLst>
+                <a:cxn ang="0">
+                  <a:pos x="T0" y="T1"/>
+                </a:cxn>
+                <a:cxn ang="0">
+                  <a:pos x="T2" y="T3"/>
+                </a:cxn>
+                <a:cxn ang="0">
+                  <a:pos x="T4" y="T5"/>
+                </a:cxn>
+                <a:cxn ang="0">
+                  <a:pos x="T6" y="T7"/>
+                </a:cxn>
+                <a:cxn ang="0">
+                  <a:pos x="T8" y="T9"/>
+                </a:cxn>
+              </a:cxnLst>
+              <a:rect l="0" t="0" r="r" b="b"/>
+              <a:pathLst>
+                <a:path w="36" h="23">
+                  <a:moveTo>
+                    <a:pt x="7" y="23"/>
+                  </a:moveTo>
+                  <a:cubicBezTo>
+                    <a:pt x="14" y="15"/>
+                    <a:pt x="25" y="11"/>
+                    <a:pt x="36" y="10"/>
+                  </a:cubicBezTo>
+                  <a:cubicBezTo>
+                    <a:pt x="36" y="0"/>
+                    <a:pt x="36" y="0"/>
+                    <a:pt x="36" y="0"/>
+                  </a:cubicBezTo>
+                  <a:cubicBezTo>
+                    <a:pt x="22" y="1"/>
+                    <a:pt x="9" y="7"/>
+                    <a:pt x="0" y="16"/>
+                  </a:cubicBezTo>
+                  <a:lnTo>
+                    <a:pt x="7" y="23"/>
+                  </a:lnTo>
+                  <a:close/>
+                </a:path>
+              </a:pathLst>
+            </a:custGeom>
+            <a:grpFill/>
+            <a:ln>
+              <a:noFill/>
+            </a:ln>
+            <a:extLst>
+              <a:ext uri="{91240B29-F687-4F45-9708-019B960494DF}">
+                <a14:hiddenLine xmlns:a14="http://schemas.microsoft.com/office/drawing/2010/main" w="9525">
+                  <a:solidFill>
+                    <a:srgbClr val="000000"/>
+                  </a:solidFill>
+                  <a:round/>
+                  <a:headEnd/>
+                  <a:tailEnd/>
+                </a14:hiddenLine>
+              </a:ext>
+            </a:extLst>
+          </p:spPr>
+          <p:txBody>
+            <a:bodyPr vert="horz" wrap="square" lIns="91440" tIns="45720" rIns="91440" bIns="45720" numCol="1" anchor="t" anchorCtr="0" compatLnSpc="1">
+              <a:prstTxWarp prst="textNoShape">
+                <a:avLst/>
+              </a:prstTxWarp>
+            </a:bodyPr>
+            <a:lstStyle/>
+            <a:p>
+              <a:endParaRPr lang="zh-CN" altLang="en-US"/>
+            </a:p>
+          </p:txBody>
+        </p:sp>
+      </p:grpSp>
+      <p:sp>
+        <p:nvSpPr>
+          <p:cNvPr id="213" name="文本框 212">
+            <a:extLst>
+              <a:ext uri="{FF2B5EF4-FFF2-40B4-BE49-F238E27FC236}">
+                <a16:creationId xmlns:a16="http://schemas.microsoft.com/office/drawing/2014/main" id="{9BDA39A2-5BA1-4E04-88C9-EBD1496C420A}"/>
+              </a:ext>
+            </a:extLst>
+          </p:cNvPr>
+          <p:cNvSpPr txBox="1"/>
+          <p:nvPr/>
+        </p:nvSpPr>
+        <p:spPr>
+          <a:xfrm>
+            <a:off x="1893163" y="2152840"/>
+            <a:ext cx="217363" cy="246221"/>
+          </a:xfrm>
+          <a:prstGeom prst="rect">
+            <a:avLst/>
+          </a:prstGeom>
+          <a:noFill/>
+        </p:spPr>
+        <p:txBody>
+          <a:bodyPr wrap="square" rtlCol="0">
+            <a:spAutoFit/>
+          </a:bodyPr>
+          <a:lstStyle/>
+          <a:p>
+            <a:r>
+              <a:rPr lang="en-US" altLang="zh-CN" sz="1000" b="1" dirty="0">
                 <a:solidFill>
                   <a:srgbClr val="00B0F0"/>
                 </a:solidFill>
                 <a:latin typeface="Aldrich" panose="02000000000000000000" pitchFamily="2" charset="0"/>
-              </a:endParaRPr>
-            </a:p>
-          </p:txBody>
-        </p:sp>
-      </p:grpSp>
+              </a:rPr>
+              <a:t>2</a:t>
+            </a:r>
+            <a:endParaRPr lang="zh-CN" altLang="en-US" sz="1000" b="1" dirty="0">
+              <a:solidFill>
+                <a:srgbClr val="00B0F0"/>
+              </a:solidFill>
+              <a:latin typeface="Aldrich" panose="02000000000000000000" pitchFamily="2" charset="0"/>
+            </a:endParaRPr>
+          </a:p>
+        </p:txBody>
+      </p:sp>
       <p:grpSp>
         <p:nvGrpSpPr>
           <p:cNvPr id="215" name="组合 214">
@@ -18239,10 +18218,10 @@
       </p:grpSp>
       <p:grpSp>
         <p:nvGrpSpPr>
-          <p:cNvPr id="1046" name="组合 1045">
+          <p:cNvPr id="1036" name="组合 1035">
             <a:extLst>
               <a:ext uri="{FF2B5EF4-FFF2-40B4-BE49-F238E27FC236}">
-                <a16:creationId xmlns:a16="http://schemas.microsoft.com/office/drawing/2014/main" id="{8154CCB6-6AB7-463C-9228-0746BF78E9A8}"/>
+                <a16:creationId xmlns:a16="http://schemas.microsoft.com/office/drawing/2014/main" id="{D01A7223-4CCD-498D-99B6-A2A3758DAE42}"/>
               </a:ext>
             </a:extLst>
           </p:cNvPr>
@@ -18251,1006 +18230,964 @@
         </p:nvGrpSpPr>
         <p:grpSpPr>
           <a:xfrm>
-            <a:off x="126207" y="2278980"/>
-            <a:ext cx="1070650" cy="327911"/>
-            <a:chOff x="126207" y="2278980"/>
-            <a:chExt cx="1070650" cy="327911"/>
+            <a:off x="411871" y="2446054"/>
+            <a:ext cx="123421" cy="115680"/>
+            <a:chOff x="5237163" y="6027738"/>
+            <a:chExt cx="455612" cy="427037"/>
           </a:xfrm>
+          <a:solidFill>
+            <a:schemeClr val="bg1">
+              <a:alpha val="60000"/>
+            </a:schemeClr>
+          </a:solidFill>
         </p:grpSpPr>
-        <p:grpSp>
-          <p:nvGrpSpPr>
-            <p:cNvPr id="1039" name="组合 1038">
+        <p:sp>
+          <p:nvSpPr>
+            <p:cNvPr id="282" name="Freeform 467">
               <a:extLst>
                 <a:ext uri="{FF2B5EF4-FFF2-40B4-BE49-F238E27FC236}">
-                  <a16:creationId xmlns:a16="http://schemas.microsoft.com/office/drawing/2014/main" id="{700EDE3B-084D-43B6-A6B7-44BA4AB8BEC2}"/>
+                  <a16:creationId xmlns:a16="http://schemas.microsoft.com/office/drawing/2014/main" id="{E9CDD50F-CEAF-4C20-83D4-22927CC3A358}"/>
                 </a:ext>
               </a:extLst>
             </p:cNvPr>
-            <p:cNvGrpSpPr/>
+            <p:cNvSpPr>
+              <a:spLocks noEditPoints="1"/>
+            </p:cNvSpPr>
             <p:nvPr/>
-          </p:nvGrpSpPr>
-          <p:grpSpPr>
+          </p:nvSpPr>
+          <p:spPr bwMode="auto">
             <a:xfrm>
-              <a:off x="411871" y="2406836"/>
-              <a:ext cx="784986" cy="200055"/>
-              <a:chOff x="506177" y="2419011"/>
-              <a:chExt cx="784986" cy="200055"/>
+              <a:off x="5237163" y="6203950"/>
+              <a:ext cx="455612" cy="250825"/>
             </a:xfrm>
-          </p:grpSpPr>
-          <p:grpSp>
-            <p:nvGrpSpPr>
-              <p:cNvPr id="1036" name="组合 1035">
-                <a:extLst>
-                  <a:ext uri="{FF2B5EF4-FFF2-40B4-BE49-F238E27FC236}">
-                    <a16:creationId xmlns:a16="http://schemas.microsoft.com/office/drawing/2014/main" id="{D01A7223-4CCD-498D-99B6-A2A3758DAE42}"/>
-                  </a:ext>
-                </a:extLst>
-              </p:cNvPr>
-              <p:cNvGrpSpPr/>
-              <p:nvPr/>
-            </p:nvGrpSpPr>
-            <p:grpSpPr>
-              <a:xfrm>
-                <a:off x="506177" y="2458229"/>
-                <a:ext cx="123421" cy="115680"/>
-                <a:chOff x="5237163" y="6027738"/>
-                <a:chExt cx="455612" cy="427037"/>
-              </a:xfrm>
-              <a:solidFill>
-                <a:schemeClr val="bg1">
-                  <a:alpha val="60000"/>
-                </a:schemeClr>
-              </a:solidFill>
-            </p:grpSpPr>
-            <p:sp>
-              <p:nvSpPr>
-                <p:cNvPr id="282" name="Freeform 467">
-                  <a:extLst>
-                    <a:ext uri="{FF2B5EF4-FFF2-40B4-BE49-F238E27FC236}">
-                      <a16:creationId xmlns:a16="http://schemas.microsoft.com/office/drawing/2014/main" id="{E9CDD50F-CEAF-4C20-83D4-22927CC3A358}"/>
-                    </a:ext>
-                  </a:extLst>
-                </p:cNvPr>
-                <p:cNvSpPr>
-                  <a:spLocks noEditPoints="1"/>
-                </p:cNvSpPr>
-                <p:nvPr/>
-              </p:nvSpPr>
-              <p:spPr bwMode="auto">
-                <a:xfrm>
-                  <a:off x="5237163" y="6203950"/>
-                  <a:ext cx="455612" cy="250825"/>
-                </a:xfrm>
-                <a:custGeom>
-                  <a:avLst/>
-                  <a:gdLst>
-                    <a:gd name="T0" fmla="*/ 4 w 142"/>
-                    <a:gd name="T1" fmla="*/ 78 h 78"/>
-                    <a:gd name="T2" fmla="*/ 6 w 142"/>
-                    <a:gd name="T3" fmla="*/ 77 h 78"/>
-                    <a:gd name="T4" fmla="*/ 48 w 142"/>
-                    <a:gd name="T5" fmla="*/ 51 h 78"/>
-                    <a:gd name="T6" fmla="*/ 90 w 142"/>
-                    <a:gd name="T7" fmla="*/ 77 h 78"/>
-                    <a:gd name="T8" fmla="*/ 91 w 142"/>
-                    <a:gd name="T9" fmla="*/ 77 h 78"/>
-                    <a:gd name="T10" fmla="*/ 91 w 142"/>
-                    <a:gd name="T11" fmla="*/ 77 h 78"/>
-                    <a:gd name="T12" fmla="*/ 92 w 142"/>
-                    <a:gd name="T13" fmla="*/ 78 h 78"/>
-                    <a:gd name="T14" fmla="*/ 92 w 142"/>
-                    <a:gd name="T15" fmla="*/ 78 h 78"/>
-                    <a:gd name="T16" fmla="*/ 92 w 142"/>
-                    <a:gd name="T17" fmla="*/ 78 h 78"/>
-                    <a:gd name="T18" fmla="*/ 92 w 142"/>
-                    <a:gd name="T19" fmla="*/ 78 h 78"/>
-                    <a:gd name="T20" fmla="*/ 93 w 142"/>
-                    <a:gd name="T21" fmla="*/ 78 h 78"/>
-                    <a:gd name="T22" fmla="*/ 94 w 142"/>
-                    <a:gd name="T23" fmla="*/ 77 h 78"/>
-                    <a:gd name="T24" fmla="*/ 94 w 142"/>
-                    <a:gd name="T25" fmla="*/ 77 h 78"/>
-                    <a:gd name="T26" fmla="*/ 94 w 142"/>
-                    <a:gd name="T27" fmla="*/ 77 h 78"/>
-                    <a:gd name="T28" fmla="*/ 139 w 142"/>
-                    <a:gd name="T29" fmla="*/ 50 h 78"/>
-                    <a:gd name="T30" fmla="*/ 140 w 142"/>
-                    <a:gd name="T31" fmla="*/ 47 h 78"/>
-                    <a:gd name="T32" fmla="*/ 142 w 142"/>
-                    <a:gd name="T33" fmla="*/ 4 h 78"/>
-                    <a:gd name="T34" fmla="*/ 141 w 142"/>
-                    <a:gd name="T35" fmla="*/ 1 h 78"/>
-                    <a:gd name="T36" fmla="*/ 137 w 142"/>
-                    <a:gd name="T37" fmla="*/ 0 h 78"/>
-                    <a:gd name="T38" fmla="*/ 112 w 142"/>
-                    <a:gd name="T39" fmla="*/ 6 h 78"/>
-                    <a:gd name="T40" fmla="*/ 110 w 142"/>
-                    <a:gd name="T41" fmla="*/ 6 h 78"/>
-                    <a:gd name="T42" fmla="*/ 110 w 142"/>
-                    <a:gd name="T43" fmla="*/ 7 h 78"/>
-                    <a:gd name="T44" fmla="*/ 109 w 142"/>
-                    <a:gd name="T45" fmla="*/ 10 h 78"/>
-                    <a:gd name="T46" fmla="*/ 106 w 142"/>
-                    <a:gd name="T47" fmla="*/ 18 h 78"/>
-                    <a:gd name="T48" fmla="*/ 90 w 142"/>
-                    <a:gd name="T49" fmla="*/ 68 h 78"/>
-                    <a:gd name="T50" fmla="*/ 54 w 142"/>
-                    <a:gd name="T51" fmla="*/ 46 h 78"/>
-                    <a:gd name="T52" fmla="*/ 72 w 142"/>
-                    <a:gd name="T53" fmla="*/ 26 h 78"/>
-                    <a:gd name="T54" fmla="*/ 69 w 142"/>
-                    <a:gd name="T55" fmla="*/ 18 h 78"/>
-                    <a:gd name="T56" fmla="*/ 46 w 142"/>
-                    <a:gd name="T57" fmla="*/ 44 h 78"/>
-                    <a:gd name="T58" fmla="*/ 25 w 142"/>
-                    <a:gd name="T59" fmla="*/ 56 h 78"/>
-                    <a:gd name="T60" fmla="*/ 58 w 142"/>
-                    <a:gd name="T61" fmla="*/ 18 h 78"/>
-                    <a:gd name="T62" fmla="*/ 68 w 142"/>
-                    <a:gd name="T63" fmla="*/ 15 h 78"/>
-                    <a:gd name="T64" fmla="*/ 66 w 142"/>
-                    <a:gd name="T65" fmla="*/ 10 h 78"/>
-                    <a:gd name="T66" fmla="*/ 65 w 142"/>
-                    <a:gd name="T67" fmla="*/ 8 h 78"/>
-                    <a:gd name="T68" fmla="*/ 55 w 142"/>
-                    <a:gd name="T69" fmla="*/ 11 h 78"/>
-                    <a:gd name="T70" fmla="*/ 53 w 142"/>
-                    <a:gd name="T71" fmla="*/ 12 h 78"/>
-                    <a:gd name="T72" fmla="*/ 1 w 142"/>
-                    <a:gd name="T73" fmla="*/ 71 h 78"/>
-                    <a:gd name="T74" fmla="*/ 1 w 142"/>
-                    <a:gd name="T75" fmla="*/ 76 h 78"/>
-                    <a:gd name="T76" fmla="*/ 4 w 142"/>
-                    <a:gd name="T77" fmla="*/ 78 h 78"/>
-                    <a:gd name="T78" fmla="*/ 115 w 142"/>
-                    <a:gd name="T79" fmla="*/ 14 h 78"/>
-                    <a:gd name="T80" fmla="*/ 134 w 142"/>
-                    <a:gd name="T81" fmla="*/ 9 h 78"/>
-                    <a:gd name="T82" fmla="*/ 133 w 142"/>
-                    <a:gd name="T83" fmla="*/ 44 h 78"/>
-                    <a:gd name="T84" fmla="*/ 99 w 142"/>
-                    <a:gd name="T85" fmla="*/ 65 h 78"/>
-                    <a:gd name="T86" fmla="*/ 115 w 142"/>
-                    <a:gd name="T87" fmla="*/ 14 h 78"/>
-                  </a:gdLst>
-                  <a:ahLst/>
-                  <a:cxnLst>
-                    <a:cxn ang="0">
-                      <a:pos x="T0" y="T1"/>
-                    </a:cxn>
-                    <a:cxn ang="0">
-                      <a:pos x="T2" y="T3"/>
-                    </a:cxn>
-                    <a:cxn ang="0">
-                      <a:pos x="T4" y="T5"/>
-                    </a:cxn>
-                    <a:cxn ang="0">
-                      <a:pos x="T6" y="T7"/>
-                    </a:cxn>
-                    <a:cxn ang="0">
-                      <a:pos x="T8" y="T9"/>
-                    </a:cxn>
-                    <a:cxn ang="0">
-                      <a:pos x="T10" y="T11"/>
-                    </a:cxn>
-                    <a:cxn ang="0">
-                      <a:pos x="T12" y="T13"/>
-                    </a:cxn>
-                    <a:cxn ang="0">
-                      <a:pos x="T14" y="T15"/>
-                    </a:cxn>
-                    <a:cxn ang="0">
-                      <a:pos x="T16" y="T17"/>
-                    </a:cxn>
-                    <a:cxn ang="0">
-                      <a:pos x="T18" y="T19"/>
-                    </a:cxn>
-                    <a:cxn ang="0">
-                      <a:pos x="T20" y="T21"/>
-                    </a:cxn>
-                    <a:cxn ang="0">
-                      <a:pos x="T22" y="T23"/>
-                    </a:cxn>
-                    <a:cxn ang="0">
-                      <a:pos x="T24" y="T25"/>
-                    </a:cxn>
-                    <a:cxn ang="0">
-                      <a:pos x="T26" y="T27"/>
-                    </a:cxn>
-                    <a:cxn ang="0">
-                      <a:pos x="T28" y="T29"/>
-                    </a:cxn>
-                    <a:cxn ang="0">
-                      <a:pos x="T30" y="T31"/>
-                    </a:cxn>
-                    <a:cxn ang="0">
-                      <a:pos x="T32" y="T33"/>
-                    </a:cxn>
-                    <a:cxn ang="0">
-                      <a:pos x="T34" y="T35"/>
-                    </a:cxn>
-                    <a:cxn ang="0">
-                      <a:pos x="T36" y="T37"/>
-                    </a:cxn>
-                    <a:cxn ang="0">
-                      <a:pos x="T38" y="T39"/>
-                    </a:cxn>
-                    <a:cxn ang="0">
-                      <a:pos x="T40" y="T41"/>
-                    </a:cxn>
-                    <a:cxn ang="0">
-                      <a:pos x="T42" y="T43"/>
-                    </a:cxn>
-                    <a:cxn ang="0">
-                      <a:pos x="T44" y="T45"/>
-                    </a:cxn>
-                    <a:cxn ang="0">
-                      <a:pos x="T46" y="T47"/>
-                    </a:cxn>
-                    <a:cxn ang="0">
-                      <a:pos x="T48" y="T49"/>
-                    </a:cxn>
-                    <a:cxn ang="0">
-                      <a:pos x="T50" y="T51"/>
-                    </a:cxn>
-                    <a:cxn ang="0">
-                      <a:pos x="T52" y="T53"/>
-                    </a:cxn>
-                    <a:cxn ang="0">
-                      <a:pos x="T54" y="T55"/>
-                    </a:cxn>
-                    <a:cxn ang="0">
-                      <a:pos x="T56" y="T57"/>
-                    </a:cxn>
-                    <a:cxn ang="0">
-                      <a:pos x="T58" y="T59"/>
-                    </a:cxn>
-                    <a:cxn ang="0">
-                      <a:pos x="T60" y="T61"/>
-                    </a:cxn>
-                    <a:cxn ang="0">
-                      <a:pos x="T62" y="T63"/>
-                    </a:cxn>
-                    <a:cxn ang="0">
-                      <a:pos x="T64" y="T65"/>
-                    </a:cxn>
-                    <a:cxn ang="0">
-                      <a:pos x="T66" y="T67"/>
-                    </a:cxn>
-                    <a:cxn ang="0">
-                      <a:pos x="T68" y="T69"/>
-                    </a:cxn>
-                    <a:cxn ang="0">
-                      <a:pos x="T70" y="T71"/>
-                    </a:cxn>
-                    <a:cxn ang="0">
-                      <a:pos x="T72" y="T73"/>
-                    </a:cxn>
-                    <a:cxn ang="0">
-                      <a:pos x="T74" y="T75"/>
-                    </a:cxn>
-                    <a:cxn ang="0">
-                      <a:pos x="T76" y="T77"/>
-                    </a:cxn>
-                    <a:cxn ang="0">
-                      <a:pos x="T78" y="T79"/>
-                    </a:cxn>
-                    <a:cxn ang="0">
-                      <a:pos x="T80" y="T81"/>
-                    </a:cxn>
-                    <a:cxn ang="0">
-                      <a:pos x="T82" y="T83"/>
-                    </a:cxn>
-                    <a:cxn ang="0">
-                      <a:pos x="T84" y="T85"/>
-                    </a:cxn>
-                    <a:cxn ang="0">
-                      <a:pos x="T86" y="T87"/>
-                    </a:cxn>
-                  </a:cxnLst>
-                  <a:rect l="0" t="0" r="r" b="b"/>
-                  <a:pathLst>
-                    <a:path w="142" h="78">
-                      <a:moveTo>
-                        <a:pt x="4" y="78"/>
-                      </a:moveTo>
-                      <a:cubicBezTo>
-                        <a:pt x="5" y="78"/>
-                        <a:pt x="6" y="77"/>
-                        <a:pt x="6" y="77"/>
-                      </a:cubicBezTo>
-                      <a:cubicBezTo>
-                        <a:pt x="48" y="51"/>
-                        <a:pt x="48" y="51"/>
-                        <a:pt x="48" y="51"/>
-                      </a:cubicBezTo>
-                      <a:cubicBezTo>
-                        <a:pt x="90" y="77"/>
-                        <a:pt x="90" y="77"/>
-                        <a:pt x="90" y="77"/>
-                      </a:cubicBezTo>
-                      <a:cubicBezTo>
-                        <a:pt x="90" y="77"/>
-                        <a:pt x="91" y="77"/>
-                        <a:pt x="91" y="77"/>
-                      </a:cubicBezTo>
-                      <a:cubicBezTo>
-                        <a:pt x="91" y="77"/>
-                        <a:pt x="91" y="77"/>
-                        <a:pt x="91" y="77"/>
-                      </a:cubicBezTo>
-                      <a:cubicBezTo>
-                        <a:pt x="92" y="78"/>
-                        <a:pt x="92" y="78"/>
-                        <a:pt x="92" y="78"/>
-                      </a:cubicBezTo>
-                      <a:cubicBezTo>
-                        <a:pt x="92" y="78"/>
-                        <a:pt x="92" y="78"/>
-                        <a:pt x="92" y="78"/>
-                      </a:cubicBezTo>
-                      <a:cubicBezTo>
-                        <a:pt x="92" y="78"/>
-                        <a:pt x="92" y="78"/>
-                        <a:pt x="92" y="78"/>
-                      </a:cubicBezTo>
-                      <a:cubicBezTo>
-                        <a:pt x="92" y="78"/>
-                        <a:pt x="92" y="78"/>
-                        <a:pt x="92" y="78"/>
-                      </a:cubicBezTo>
-                      <a:cubicBezTo>
-                        <a:pt x="93" y="78"/>
-                        <a:pt x="93" y="78"/>
-                        <a:pt x="93" y="78"/>
-                      </a:cubicBezTo>
-                      <a:cubicBezTo>
-                        <a:pt x="93" y="77"/>
-                        <a:pt x="94" y="77"/>
-                        <a:pt x="94" y="77"/>
-                      </a:cubicBezTo>
-                      <a:cubicBezTo>
-                        <a:pt x="94" y="77"/>
-                        <a:pt x="94" y="77"/>
-                        <a:pt x="94" y="77"/>
-                      </a:cubicBezTo>
-                      <a:cubicBezTo>
-                        <a:pt x="94" y="77"/>
-                        <a:pt x="94" y="77"/>
-                        <a:pt x="94" y="77"/>
-                      </a:cubicBezTo>
-                      <a:cubicBezTo>
-                        <a:pt x="139" y="50"/>
-                        <a:pt x="139" y="50"/>
-                        <a:pt x="139" y="50"/>
-                      </a:cubicBezTo>
-                      <a:cubicBezTo>
-                        <a:pt x="140" y="49"/>
-                        <a:pt x="140" y="48"/>
-                        <a:pt x="140" y="47"/>
-                      </a:cubicBezTo>
-                      <a:cubicBezTo>
-                        <a:pt x="142" y="4"/>
-                        <a:pt x="142" y="4"/>
-                        <a:pt x="142" y="4"/>
-                      </a:cubicBezTo>
-                      <a:cubicBezTo>
-                        <a:pt x="142" y="3"/>
-                        <a:pt x="142" y="2"/>
-                        <a:pt x="141" y="1"/>
-                      </a:cubicBezTo>
-                      <a:cubicBezTo>
-                        <a:pt x="140" y="0"/>
-                        <a:pt x="139" y="0"/>
-                        <a:pt x="137" y="0"/>
-                      </a:cubicBezTo>
-                      <a:cubicBezTo>
-                        <a:pt x="112" y="6"/>
-                        <a:pt x="112" y="6"/>
-                        <a:pt x="112" y="6"/>
-                      </a:cubicBezTo>
-                      <a:cubicBezTo>
-                        <a:pt x="110" y="6"/>
-                        <a:pt x="110" y="6"/>
-                        <a:pt x="110" y="6"/>
-                      </a:cubicBezTo>
-                      <a:cubicBezTo>
-                        <a:pt x="110" y="6"/>
-                        <a:pt x="110" y="7"/>
-                        <a:pt x="110" y="7"/>
-                      </a:cubicBezTo>
-                      <a:cubicBezTo>
-                        <a:pt x="109" y="8"/>
-                        <a:pt x="109" y="9"/>
-                        <a:pt x="109" y="10"/>
-                      </a:cubicBezTo>
-                      <a:cubicBezTo>
-                        <a:pt x="108" y="13"/>
-                        <a:pt x="107" y="16"/>
-                        <a:pt x="106" y="18"/>
-                      </a:cubicBezTo>
-                      <a:cubicBezTo>
-                        <a:pt x="90" y="68"/>
-                        <a:pt x="90" y="68"/>
-                        <a:pt x="90" y="68"/>
-                      </a:cubicBezTo>
-                      <a:cubicBezTo>
-                        <a:pt x="54" y="46"/>
-                        <a:pt x="54" y="46"/>
-                        <a:pt x="54" y="46"/>
-                      </a:cubicBezTo>
-                      <a:cubicBezTo>
-                        <a:pt x="72" y="26"/>
-                        <a:pt x="72" y="26"/>
-                        <a:pt x="72" y="26"/>
-                      </a:cubicBezTo>
-                      <a:cubicBezTo>
-                        <a:pt x="71" y="23"/>
-                        <a:pt x="70" y="21"/>
-                        <a:pt x="69" y="18"/>
-                      </a:cubicBezTo>
-                      <a:cubicBezTo>
-                        <a:pt x="46" y="44"/>
-                        <a:pt x="46" y="44"/>
-                        <a:pt x="46" y="44"/>
-                      </a:cubicBezTo>
-                      <a:cubicBezTo>
-                        <a:pt x="25" y="56"/>
-                        <a:pt x="25" y="56"/>
-                        <a:pt x="25" y="56"/>
-                      </a:cubicBezTo>
-                      <a:cubicBezTo>
-                        <a:pt x="58" y="18"/>
-                        <a:pt x="58" y="18"/>
-                        <a:pt x="58" y="18"/>
-                      </a:cubicBezTo>
-                      <a:cubicBezTo>
-                        <a:pt x="68" y="15"/>
-                        <a:pt x="68" y="15"/>
-                        <a:pt x="68" y="15"/>
-                      </a:cubicBezTo>
-                      <a:cubicBezTo>
-                        <a:pt x="67" y="14"/>
-                        <a:pt x="67" y="12"/>
-                        <a:pt x="66" y="10"/>
-                      </a:cubicBezTo>
-                      <a:cubicBezTo>
-                        <a:pt x="66" y="9"/>
-                        <a:pt x="65" y="8"/>
-                        <a:pt x="65" y="8"/>
-                      </a:cubicBezTo>
-                      <a:cubicBezTo>
-                        <a:pt x="55" y="11"/>
-                        <a:pt x="55" y="11"/>
-                        <a:pt x="55" y="11"/>
-                      </a:cubicBezTo>
-                      <a:cubicBezTo>
-                        <a:pt x="54" y="11"/>
-                        <a:pt x="53" y="12"/>
-                        <a:pt x="53" y="12"/>
-                      </a:cubicBezTo>
-                      <a:cubicBezTo>
-                        <a:pt x="1" y="71"/>
-                        <a:pt x="1" y="71"/>
-                        <a:pt x="1" y="71"/>
-                      </a:cubicBezTo>
-                      <a:cubicBezTo>
-                        <a:pt x="0" y="72"/>
-                        <a:pt x="0" y="75"/>
-                        <a:pt x="1" y="76"/>
-                      </a:cubicBezTo>
-                      <a:cubicBezTo>
-                        <a:pt x="2" y="77"/>
-                        <a:pt x="3" y="78"/>
-                        <a:pt x="4" y="78"/>
-                      </a:cubicBezTo>
-                      <a:close/>
-                      <a:moveTo>
-                        <a:pt x="115" y="14"/>
-                      </a:moveTo>
-                      <a:cubicBezTo>
-                        <a:pt x="134" y="9"/>
-                        <a:pt x="134" y="9"/>
-                        <a:pt x="134" y="9"/>
-                      </a:cubicBezTo>
-                      <a:cubicBezTo>
-                        <a:pt x="133" y="44"/>
-                        <a:pt x="133" y="44"/>
-                        <a:pt x="133" y="44"/>
-                      </a:cubicBezTo>
-                      <a:cubicBezTo>
-                        <a:pt x="99" y="65"/>
-                        <a:pt x="99" y="65"/>
-                        <a:pt x="99" y="65"/>
-                      </a:cubicBezTo>
-                      <a:lnTo>
-                        <a:pt x="115" y="14"/>
-                      </a:lnTo>
-                      <a:close/>
-                    </a:path>
-                  </a:pathLst>
-                </a:custGeom>
-                <a:grpFill/>
-                <a:ln>
-                  <a:noFill/>
-                </a:ln>
-                <a:extLst>
-                  <a:ext uri="{91240B29-F687-4F45-9708-019B960494DF}">
-                    <a14:hiddenLine xmlns:a14="http://schemas.microsoft.com/office/drawing/2010/main" w="9525">
-                      <a:solidFill>
-                        <a:srgbClr val="000000"/>
-                      </a:solidFill>
-                      <a:round/>
-                      <a:headEnd/>
-                      <a:tailEnd/>
-                    </a14:hiddenLine>
-                  </a:ext>
-                </a:extLst>
-              </p:spPr>
-              <p:txBody>
-                <a:bodyPr vert="horz" wrap="square" lIns="91440" tIns="45720" rIns="91440" bIns="45720" numCol="1" anchor="t" anchorCtr="0" compatLnSpc="1">
-                  <a:prstTxWarp prst="textNoShape">
-                    <a:avLst/>
-                  </a:prstTxWarp>
-                </a:bodyPr>
-                <a:lstStyle/>
-                <a:p>
-                  <a:endParaRPr lang="zh-CN" altLang="en-US"/>
-                </a:p>
-              </p:txBody>
-            </p:sp>
-            <p:sp>
-              <p:nvSpPr>
-                <p:cNvPr id="283" name="Freeform 468">
-                  <a:extLst>
-                    <a:ext uri="{FF2B5EF4-FFF2-40B4-BE49-F238E27FC236}">
-                      <a16:creationId xmlns:a16="http://schemas.microsoft.com/office/drawing/2014/main" id="{A071CE95-BAA2-4305-9203-292E61DE46A2}"/>
-                    </a:ext>
-                  </a:extLst>
-                </p:cNvPr>
-                <p:cNvSpPr>
-                  <a:spLocks noEditPoints="1"/>
-                </p:cNvSpPr>
-                <p:nvPr/>
-              </p:nvSpPr>
-              <p:spPr bwMode="auto">
-                <a:xfrm>
-                  <a:off x="5429250" y="6027738"/>
-                  <a:ext cx="173037" cy="295275"/>
-                </a:xfrm>
-                <a:custGeom>
-                  <a:avLst/>
-                  <a:gdLst>
-                    <a:gd name="T0" fmla="*/ 0 w 54"/>
-                    <a:gd name="T1" fmla="*/ 27 h 92"/>
-                    <a:gd name="T2" fmla="*/ 27 w 54"/>
-                    <a:gd name="T3" fmla="*/ 92 h 92"/>
-                    <a:gd name="T4" fmla="*/ 54 w 54"/>
-                    <a:gd name="T5" fmla="*/ 27 h 92"/>
-                    <a:gd name="T6" fmla="*/ 27 w 54"/>
-                    <a:gd name="T7" fmla="*/ 0 h 92"/>
-                    <a:gd name="T8" fmla="*/ 0 w 54"/>
-                    <a:gd name="T9" fmla="*/ 27 h 92"/>
-                    <a:gd name="T10" fmla="*/ 46 w 54"/>
-                    <a:gd name="T11" fmla="*/ 27 h 92"/>
-                    <a:gd name="T12" fmla="*/ 27 w 54"/>
-                    <a:gd name="T13" fmla="*/ 83 h 92"/>
-                    <a:gd name="T14" fmla="*/ 8 w 54"/>
-                    <a:gd name="T15" fmla="*/ 27 h 92"/>
-                    <a:gd name="T16" fmla="*/ 27 w 54"/>
-                    <a:gd name="T17" fmla="*/ 8 h 92"/>
-                    <a:gd name="T18" fmla="*/ 46 w 54"/>
-                    <a:gd name="T19" fmla="*/ 27 h 92"/>
-                  </a:gdLst>
-                  <a:ahLst/>
-                  <a:cxnLst>
-                    <a:cxn ang="0">
-                      <a:pos x="T0" y="T1"/>
-                    </a:cxn>
-                    <a:cxn ang="0">
-                      <a:pos x="T2" y="T3"/>
-                    </a:cxn>
-                    <a:cxn ang="0">
-                      <a:pos x="T4" y="T5"/>
-                    </a:cxn>
-                    <a:cxn ang="0">
-                      <a:pos x="T6" y="T7"/>
-                    </a:cxn>
-                    <a:cxn ang="0">
-                      <a:pos x="T8" y="T9"/>
-                    </a:cxn>
-                    <a:cxn ang="0">
-                      <a:pos x="T10" y="T11"/>
-                    </a:cxn>
-                    <a:cxn ang="0">
-                      <a:pos x="T12" y="T13"/>
-                    </a:cxn>
-                    <a:cxn ang="0">
-                      <a:pos x="T14" y="T15"/>
-                    </a:cxn>
-                    <a:cxn ang="0">
-                      <a:pos x="T16" y="T17"/>
-                    </a:cxn>
-                    <a:cxn ang="0">
-                      <a:pos x="T18" y="T19"/>
-                    </a:cxn>
-                  </a:cxnLst>
-                  <a:rect l="0" t="0" r="r" b="b"/>
-                  <a:pathLst>
-                    <a:path w="54" h="92">
-                      <a:moveTo>
-                        <a:pt x="0" y="27"/>
-                      </a:moveTo>
-                      <a:cubicBezTo>
-                        <a:pt x="0" y="37"/>
-                        <a:pt x="16" y="92"/>
-                        <a:pt x="27" y="92"/>
-                      </a:cubicBezTo>
-                      <a:cubicBezTo>
-                        <a:pt x="38" y="92"/>
-                        <a:pt x="54" y="37"/>
-                        <a:pt x="54" y="27"/>
-                      </a:cubicBezTo>
-                      <a:cubicBezTo>
-                        <a:pt x="54" y="12"/>
-                        <a:pt x="42" y="0"/>
-                        <a:pt x="27" y="0"/>
-                      </a:cubicBezTo>
-                      <a:cubicBezTo>
-                        <a:pt x="12" y="0"/>
-                        <a:pt x="0" y="12"/>
-                        <a:pt x="0" y="27"/>
-                      </a:cubicBezTo>
-                      <a:close/>
-                      <a:moveTo>
-                        <a:pt x="46" y="27"/>
-                      </a:moveTo>
-                      <a:cubicBezTo>
-                        <a:pt x="46" y="38"/>
-                        <a:pt x="33" y="75"/>
-                        <a:pt x="27" y="83"/>
-                      </a:cubicBezTo>
-                      <a:cubicBezTo>
-                        <a:pt x="21" y="75"/>
-                        <a:pt x="8" y="38"/>
-                        <a:pt x="8" y="27"/>
-                      </a:cubicBezTo>
-                      <a:cubicBezTo>
-                        <a:pt x="8" y="17"/>
-                        <a:pt x="17" y="8"/>
-                        <a:pt x="27" y="8"/>
-                      </a:cubicBezTo>
-                      <a:cubicBezTo>
-                        <a:pt x="38" y="8"/>
-                        <a:pt x="46" y="17"/>
-                        <a:pt x="46" y="27"/>
-                      </a:cubicBezTo>
-                      <a:close/>
-                    </a:path>
-                  </a:pathLst>
-                </a:custGeom>
-                <a:grpFill/>
-                <a:ln>
-                  <a:noFill/>
-                </a:ln>
-                <a:extLst>
-                  <a:ext uri="{91240B29-F687-4F45-9708-019B960494DF}">
-                    <a14:hiddenLine xmlns:a14="http://schemas.microsoft.com/office/drawing/2010/main" w="9525">
-                      <a:solidFill>
-                        <a:srgbClr val="000000"/>
-                      </a:solidFill>
-                      <a:round/>
-                      <a:headEnd/>
-                      <a:tailEnd/>
-                    </a14:hiddenLine>
-                  </a:ext>
-                </a:extLst>
-              </p:spPr>
-              <p:txBody>
-                <a:bodyPr vert="horz" wrap="square" lIns="91440" tIns="45720" rIns="91440" bIns="45720" numCol="1" anchor="t" anchorCtr="0" compatLnSpc="1">
-                  <a:prstTxWarp prst="textNoShape">
-                    <a:avLst/>
-                  </a:prstTxWarp>
-                </a:bodyPr>
-                <a:lstStyle/>
-                <a:p>
-                  <a:endParaRPr lang="zh-CN" altLang="en-US"/>
-                </a:p>
-              </p:txBody>
-            </p:sp>
-            <p:sp>
-              <p:nvSpPr>
-                <p:cNvPr id="284" name="Freeform 469">
-                  <a:extLst>
-                    <a:ext uri="{FF2B5EF4-FFF2-40B4-BE49-F238E27FC236}">
-                      <a16:creationId xmlns:a16="http://schemas.microsoft.com/office/drawing/2014/main" id="{FE424C5F-4408-422A-8535-88D021C36F4C}"/>
-                    </a:ext>
-                  </a:extLst>
-                </p:cNvPr>
-                <p:cNvSpPr>
-                  <a:spLocks noEditPoints="1"/>
-                </p:cNvSpPr>
-                <p:nvPr/>
-              </p:nvSpPr>
-              <p:spPr bwMode="auto">
-                <a:xfrm>
-                  <a:off x="5475287" y="6072188"/>
-                  <a:ext cx="85724" cy="84139"/>
-                </a:xfrm>
-                <a:custGeom>
-                  <a:avLst/>
-                  <a:gdLst>
-                    <a:gd name="T0" fmla="*/ 0 w 27"/>
-                    <a:gd name="T1" fmla="*/ 13 h 26"/>
-                    <a:gd name="T2" fmla="*/ 13 w 27"/>
-                    <a:gd name="T3" fmla="*/ 26 h 26"/>
-                    <a:gd name="T4" fmla="*/ 27 w 27"/>
-                    <a:gd name="T5" fmla="*/ 13 h 26"/>
-                    <a:gd name="T6" fmla="*/ 13 w 27"/>
-                    <a:gd name="T7" fmla="*/ 0 h 26"/>
-                    <a:gd name="T8" fmla="*/ 0 w 27"/>
-                    <a:gd name="T9" fmla="*/ 13 h 26"/>
-                    <a:gd name="T10" fmla="*/ 19 w 27"/>
-                    <a:gd name="T11" fmla="*/ 13 h 26"/>
-                    <a:gd name="T12" fmla="*/ 13 w 27"/>
-                    <a:gd name="T13" fmla="*/ 18 h 26"/>
-                    <a:gd name="T14" fmla="*/ 8 w 27"/>
-                    <a:gd name="T15" fmla="*/ 13 h 26"/>
-                    <a:gd name="T16" fmla="*/ 13 w 27"/>
-                    <a:gd name="T17" fmla="*/ 8 h 26"/>
-                    <a:gd name="T18" fmla="*/ 19 w 27"/>
-                    <a:gd name="T19" fmla="*/ 13 h 26"/>
-                  </a:gdLst>
-                  <a:ahLst/>
-                  <a:cxnLst>
-                    <a:cxn ang="0">
-                      <a:pos x="T0" y="T1"/>
-                    </a:cxn>
-                    <a:cxn ang="0">
-                      <a:pos x="T2" y="T3"/>
-                    </a:cxn>
-                    <a:cxn ang="0">
-                      <a:pos x="T4" y="T5"/>
-                    </a:cxn>
-                    <a:cxn ang="0">
-                      <a:pos x="T6" y="T7"/>
-                    </a:cxn>
-                    <a:cxn ang="0">
-                      <a:pos x="T8" y="T9"/>
-                    </a:cxn>
-                    <a:cxn ang="0">
-                      <a:pos x="T10" y="T11"/>
-                    </a:cxn>
-                    <a:cxn ang="0">
-                      <a:pos x="T12" y="T13"/>
-                    </a:cxn>
-                    <a:cxn ang="0">
-                      <a:pos x="T14" y="T15"/>
-                    </a:cxn>
-                    <a:cxn ang="0">
-                      <a:pos x="T16" y="T17"/>
-                    </a:cxn>
-                    <a:cxn ang="0">
-                      <a:pos x="T18" y="T19"/>
-                    </a:cxn>
-                  </a:cxnLst>
-                  <a:rect l="0" t="0" r="r" b="b"/>
-                  <a:pathLst>
-                    <a:path w="27" h="26">
-                      <a:moveTo>
-                        <a:pt x="0" y="13"/>
-                      </a:moveTo>
-                      <a:cubicBezTo>
-                        <a:pt x="0" y="20"/>
-                        <a:pt x="6" y="26"/>
-                        <a:pt x="13" y="26"/>
-                      </a:cubicBezTo>
-                      <a:cubicBezTo>
-                        <a:pt x="21" y="26"/>
-                        <a:pt x="27" y="20"/>
-                        <a:pt x="27" y="13"/>
-                      </a:cubicBezTo>
-                      <a:cubicBezTo>
-                        <a:pt x="27" y="6"/>
-                        <a:pt x="21" y="0"/>
-                        <a:pt x="13" y="0"/>
-                      </a:cubicBezTo>
-                      <a:cubicBezTo>
-                        <a:pt x="6" y="0"/>
-                        <a:pt x="0" y="6"/>
-                        <a:pt x="0" y="13"/>
-                      </a:cubicBezTo>
-                      <a:close/>
-                      <a:moveTo>
-                        <a:pt x="19" y="13"/>
-                      </a:moveTo>
-                      <a:cubicBezTo>
-                        <a:pt x="19" y="16"/>
-                        <a:pt x="16" y="18"/>
-                        <a:pt x="13" y="18"/>
-                      </a:cubicBezTo>
-                      <a:cubicBezTo>
-                        <a:pt x="10" y="18"/>
-                        <a:pt x="8" y="16"/>
-                        <a:pt x="8" y="13"/>
-                      </a:cubicBezTo>
-                      <a:cubicBezTo>
-                        <a:pt x="8" y="10"/>
-                        <a:pt x="10" y="8"/>
-                        <a:pt x="13" y="8"/>
-                      </a:cubicBezTo>
-                      <a:cubicBezTo>
-                        <a:pt x="16" y="8"/>
-                        <a:pt x="19" y="10"/>
-                        <a:pt x="19" y="13"/>
-                      </a:cubicBezTo>
-                      <a:close/>
-                    </a:path>
-                  </a:pathLst>
-                </a:custGeom>
-                <a:grpFill/>
-                <a:ln>
-                  <a:noFill/>
-                </a:ln>
-                <a:extLst>
-                  <a:ext uri="{91240B29-F687-4F45-9708-019B960494DF}">
-                    <a14:hiddenLine xmlns:a14="http://schemas.microsoft.com/office/drawing/2010/main" w="9525">
-                      <a:solidFill>
-                        <a:srgbClr val="000000"/>
-                      </a:solidFill>
-                      <a:round/>
-                      <a:headEnd/>
-                      <a:tailEnd/>
-                    </a14:hiddenLine>
-                  </a:ext>
-                </a:extLst>
-              </p:spPr>
-              <p:txBody>
-                <a:bodyPr vert="horz" wrap="square" lIns="91440" tIns="45720" rIns="91440" bIns="45720" numCol="1" anchor="t" anchorCtr="0" compatLnSpc="1">
-                  <a:prstTxWarp prst="textNoShape">
-                    <a:avLst/>
-                  </a:prstTxWarp>
-                </a:bodyPr>
-                <a:lstStyle/>
-                <a:p>
-                  <a:endParaRPr lang="zh-CN" altLang="en-US"/>
-                </a:p>
-              </p:txBody>
-            </p:sp>
-          </p:grpSp>
-          <p:sp>
-            <p:nvSpPr>
-              <p:cNvPr id="1037" name="文本框 1036">
-                <a:extLst>
-                  <a:ext uri="{FF2B5EF4-FFF2-40B4-BE49-F238E27FC236}">
-                    <a16:creationId xmlns:a16="http://schemas.microsoft.com/office/drawing/2014/main" id="{218C670D-792C-406E-8E81-25A364226B91}"/>
-                  </a:ext>
-                </a:extLst>
-              </p:cNvPr>
-              <p:cNvSpPr txBox="1"/>
-              <p:nvPr/>
-            </p:nvSpPr>
-            <p:spPr>
-              <a:xfrm>
-                <a:off x="567888" y="2419011"/>
-                <a:ext cx="723275" cy="200055"/>
-              </a:xfrm>
-              <a:prstGeom prst="rect">
+            <a:custGeom>
+              <a:avLst/>
+              <a:gdLst>
+                <a:gd name="T0" fmla="*/ 4 w 142"/>
+                <a:gd name="T1" fmla="*/ 78 h 78"/>
+                <a:gd name="T2" fmla="*/ 6 w 142"/>
+                <a:gd name="T3" fmla="*/ 77 h 78"/>
+                <a:gd name="T4" fmla="*/ 48 w 142"/>
+                <a:gd name="T5" fmla="*/ 51 h 78"/>
+                <a:gd name="T6" fmla="*/ 90 w 142"/>
+                <a:gd name="T7" fmla="*/ 77 h 78"/>
+                <a:gd name="T8" fmla="*/ 91 w 142"/>
+                <a:gd name="T9" fmla="*/ 77 h 78"/>
+                <a:gd name="T10" fmla="*/ 91 w 142"/>
+                <a:gd name="T11" fmla="*/ 77 h 78"/>
+                <a:gd name="T12" fmla="*/ 92 w 142"/>
+                <a:gd name="T13" fmla="*/ 78 h 78"/>
+                <a:gd name="T14" fmla="*/ 92 w 142"/>
+                <a:gd name="T15" fmla="*/ 78 h 78"/>
+                <a:gd name="T16" fmla="*/ 92 w 142"/>
+                <a:gd name="T17" fmla="*/ 78 h 78"/>
+                <a:gd name="T18" fmla="*/ 92 w 142"/>
+                <a:gd name="T19" fmla="*/ 78 h 78"/>
+                <a:gd name="T20" fmla="*/ 93 w 142"/>
+                <a:gd name="T21" fmla="*/ 78 h 78"/>
+                <a:gd name="T22" fmla="*/ 94 w 142"/>
+                <a:gd name="T23" fmla="*/ 77 h 78"/>
+                <a:gd name="T24" fmla="*/ 94 w 142"/>
+                <a:gd name="T25" fmla="*/ 77 h 78"/>
+                <a:gd name="T26" fmla="*/ 94 w 142"/>
+                <a:gd name="T27" fmla="*/ 77 h 78"/>
+                <a:gd name="T28" fmla="*/ 139 w 142"/>
+                <a:gd name="T29" fmla="*/ 50 h 78"/>
+                <a:gd name="T30" fmla="*/ 140 w 142"/>
+                <a:gd name="T31" fmla="*/ 47 h 78"/>
+                <a:gd name="T32" fmla="*/ 142 w 142"/>
+                <a:gd name="T33" fmla="*/ 4 h 78"/>
+                <a:gd name="T34" fmla="*/ 141 w 142"/>
+                <a:gd name="T35" fmla="*/ 1 h 78"/>
+                <a:gd name="T36" fmla="*/ 137 w 142"/>
+                <a:gd name="T37" fmla="*/ 0 h 78"/>
+                <a:gd name="T38" fmla="*/ 112 w 142"/>
+                <a:gd name="T39" fmla="*/ 6 h 78"/>
+                <a:gd name="T40" fmla="*/ 110 w 142"/>
+                <a:gd name="T41" fmla="*/ 6 h 78"/>
+                <a:gd name="T42" fmla="*/ 110 w 142"/>
+                <a:gd name="T43" fmla="*/ 7 h 78"/>
+                <a:gd name="T44" fmla="*/ 109 w 142"/>
+                <a:gd name="T45" fmla="*/ 10 h 78"/>
+                <a:gd name="T46" fmla="*/ 106 w 142"/>
+                <a:gd name="T47" fmla="*/ 18 h 78"/>
+                <a:gd name="T48" fmla="*/ 90 w 142"/>
+                <a:gd name="T49" fmla="*/ 68 h 78"/>
+                <a:gd name="T50" fmla="*/ 54 w 142"/>
+                <a:gd name="T51" fmla="*/ 46 h 78"/>
+                <a:gd name="T52" fmla="*/ 72 w 142"/>
+                <a:gd name="T53" fmla="*/ 26 h 78"/>
+                <a:gd name="T54" fmla="*/ 69 w 142"/>
+                <a:gd name="T55" fmla="*/ 18 h 78"/>
+                <a:gd name="T56" fmla="*/ 46 w 142"/>
+                <a:gd name="T57" fmla="*/ 44 h 78"/>
+                <a:gd name="T58" fmla="*/ 25 w 142"/>
+                <a:gd name="T59" fmla="*/ 56 h 78"/>
+                <a:gd name="T60" fmla="*/ 58 w 142"/>
+                <a:gd name="T61" fmla="*/ 18 h 78"/>
+                <a:gd name="T62" fmla="*/ 68 w 142"/>
+                <a:gd name="T63" fmla="*/ 15 h 78"/>
+                <a:gd name="T64" fmla="*/ 66 w 142"/>
+                <a:gd name="T65" fmla="*/ 10 h 78"/>
+                <a:gd name="T66" fmla="*/ 65 w 142"/>
+                <a:gd name="T67" fmla="*/ 8 h 78"/>
+                <a:gd name="T68" fmla="*/ 55 w 142"/>
+                <a:gd name="T69" fmla="*/ 11 h 78"/>
+                <a:gd name="T70" fmla="*/ 53 w 142"/>
+                <a:gd name="T71" fmla="*/ 12 h 78"/>
+                <a:gd name="T72" fmla="*/ 1 w 142"/>
+                <a:gd name="T73" fmla="*/ 71 h 78"/>
+                <a:gd name="T74" fmla="*/ 1 w 142"/>
+                <a:gd name="T75" fmla="*/ 76 h 78"/>
+                <a:gd name="T76" fmla="*/ 4 w 142"/>
+                <a:gd name="T77" fmla="*/ 78 h 78"/>
+                <a:gd name="T78" fmla="*/ 115 w 142"/>
+                <a:gd name="T79" fmla="*/ 14 h 78"/>
+                <a:gd name="T80" fmla="*/ 134 w 142"/>
+                <a:gd name="T81" fmla="*/ 9 h 78"/>
+                <a:gd name="T82" fmla="*/ 133 w 142"/>
+                <a:gd name="T83" fmla="*/ 44 h 78"/>
+                <a:gd name="T84" fmla="*/ 99 w 142"/>
+                <a:gd name="T85" fmla="*/ 65 h 78"/>
+                <a:gd name="T86" fmla="*/ 115 w 142"/>
+                <a:gd name="T87" fmla="*/ 14 h 78"/>
+              </a:gdLst>
+              <a:ahLst/>
+              <a:cxnLst>
+                <a:cxn ang="0">
+                  <a:pos x="T0" y="T1"/>
+                </a:cxn>
+                <a:cxn ang="0">
+                  <a:pos x="T2" y="T3"/>
+                </a:cxn>
+                <a:cxn ang="0">
+                  <a:pos x="T4" y="T5"/>
+                </a:cxn>
+                <a:cxn ang="0">
+                  <a:pos x="T6" y="T7"/>
+                </a:cxn>
+                <a:cxn ang="0">
+                  <a:pos x="T8" y="T9"/>
+                </a:cxn>
+                <a:cxn ang="0">
+                  <a:pos x="T10" y="T11"/>
+                </a:cxn>
+                <a:cxn ang="0">
+                  <a:pos x="T12" y="T13"/>
+                </a:cxn>
+                <a:cxn ang="0">
+                  <a:pos x="T14" y="T15"/>
+                </a:cxn>
+                <a:cxn ang="0">
+                  <a:pos x="T16" y="T17"/>
+                </a:cxn>
+                <a:cxn ang="0">
+                  <a:pos x="T18" y="T19"/>
+                </a:cxn>
+                <a:cxn ang="0">
+                  <a:pos x="T20" y="T21"/>
+                </a:cxn>
+                <a:cxn ang="0">
+                  <a:pos x="T22" y="T23"/>
+                </a:cxn>
+                <a:cxn ang="0">
+                  <a:pos x="T24" y="T25"/>
+                </a:cxn>
+                <a:cxn ang="0">
+                  <a:pos x="T26" y="T27"/>
+                </a:cxn>
+                <a:cxn ang="0">
+                  <a:pos x="T28" y="T29"/>
+                </a:cxn>
+                <a:cxn ang="0">
+                  <a:pos x="T30" y="T31"/>
+                </a:cxn>
+                <a:cxn ang="0">
+                  <a:pos x="T32" y="T33"/>
+                </a:cxn>
+                <a:cxn ang="0">
+                  <a:pos x="T34" y="T35"/>
+                </a:cxn>
+                <a:cxn ang="0">
+                  <a:pos x="T36" y="T37"/>
+                </a:cxn>
+                <a:cxn ang="0">
+                  <a:pos x="T38" y="T39"/>
+                </a:cxn>
+                <a:cxn ang="0">
+                  <a:pos x="T40" y="T41"/>
+                </a:cxn>
+                <a:cxn ang="0">
+                  <a:pos x="T42" y="T43"/>
+                </a:cxn>
+                <a:cxn ang="0">
+                  <a:pos x="T44" y="T45"/>
+                </a:cxn>
+                <a:cxn ang="0">
+                  <a:pos x="T46" y="T47"/>
+                </a:cxn>
+                <a:cxn ang="0">
+                  <a:pos x="T48" y="T49"/>
+                </a:cxn>
+                <a:cxn ang="0">
+                  <a:pos x="T50" y="T51"/>
+                </a:cxn>
+                <a:cxn ang="0">
+                  <a:pos x="T52" y="T53"/>
+                </a:cxn>
+                <a:cxn ang="0">
+                  <a:pos x="T54" y="T55"/>
+                </a:cxn>
+                <a:cxn ang="0">
+                  <a:pos x="T56" y="T57"/>
+                </a:cxn>
+                <a:cxn ang="0">
+                  <a:pos x="T58" y="T59"/>
+                </a:cxn>
+                <a:cxn ang="0">
+                  <a:pos x="T60" y="T61"/>
+                </a:cxn>
+                <a:cxn ang="0">
+                  <a:pos x="T62" y="T63"/>
+                </a:cxn>
+                <a:cxn ang="0">
+                  <a:pos x="T64" y="T65"/>
+                </a:cxn>
+                <a:cxn ang="0">
+                  <a:pos x="T66" y="T67"/>
+                </a:cxn>
+                <a:cxn ang="0">
+                  <a:pos x="T68" y="T69"/>
+                </a:cxn>
+                <a:cxn ang="0">
+                  <a:pos x="T70" y="T71"/>
+                </a:cxn>
+                <a:cxn ang="0">
+                  <a:pos x="T72" y="T73"/>
+                </a:cxn>
+                <a:cxn ang="0">
+                  <a:pos x="T74" y="T75"/>
+                </a:cxn>
+                <a:cxn ang="0">
+                  <a:pos x="T76" y="T77"/>
+                </a:cxn>
+                <a:cxn ang="0">
+                  <a:pos x="T78" y="T79"/>
+                </a:cxn>
+                <a:cxn ang="0">
+                  <a:pos x="T80" y="T81"/>
+                </a:cxn>
+                <a:cxn ang="0">
+                  <a:pos x="T82" y="T83"/>
+                </a:cxn>
+                <a:cxn ang="0">
+                  <a:pos x="T84" y="T85"/>
+                </a:cxn>
+                <a:cxn ang="0">
+                  <a:pos x="T86" y="T87"/>
+                </a:cxn>
+              </a:cxnLst>
+              <a:rect l="0" t="0" r="r" b="b"/>
+              <a:pathLst>
+                <a:path w="142" h="78">
+                  <a:moveTo>
+                    <a:pt x="4" y="78"/>
+                  </a:moveTo>
+                  <a:cubicBezTo>
+                    <a:pt x="5" y="78"/>
+                    <a:pt x="6" y="77"/>
+                    <a:pt x="6" y="77"/>
+                  </a:cubicBezTo>
+                  <a:cubicBezTo>
+                    <a:pt x="48" y="51"/>
+                    <a:pt x="48" y="51"/>
+                    <a:pt x="48" y="51"/>
+                  </a:cubicBezTo>
+                  <a:cubicBezTo>
+                    <a:pt x="90" y="77"/>
+                    <a:pt x="90" y="77"/>
+                    <a:pt x="90" y="77"/>
+                  </a:cubicBezTo>
+                  <a:cubicBezTo>
+                    <a:pt x="90" y="77"/>
+                    <a:pt x="91" y="77"/>
+                    <a:pt x="91" y="77"/>
+                  </a:cubicBezTo>
+                  <a:cubicBezTo>
+                    <a:pt x="91" y="77"/>
+                    <a:pt x="91" y="77"/>
+                    <a:pt x="91" y="77"/>
+                  </a:cubicBezTo>
+                  <a:cubicBezTo>
+                    <a:pt x="92" y="78"/>
+                    <a:pt x="92" y="78"/>
+                    <a:pt x="92" y="78"/>
+                  </a:cubicBezTo>
+                  <a:cubicBezTo>
+                    <a:pt x="92" y="78"/>
+                    <a:pt x="92" y="78"/>
+                    <a:pt x="92" y="78"/>
+                  </a:cubicBezTo>
+                  <a:cubicBezTo>
+                    <a:pt x="92" y="78"/>
+                    <a:pt x="92" y="78"/>
+                    <a:pt x="92" y="78"/>
+                  </a:cubicBezTo>
+                  <a:cubicBezTo>
+                    <a:pt x="92" y="78"/>
+                    <a:pt x="92" y="78"/>
+                    <a:pt x="92" y="78"/>
+                  </a:cubicBezTo>
+                  <a:cubicBezTo>
+                    <a:pt x="93" y="78"/>
+                    <a:pt x="93" y="78"/>
+                    <a:pt x="93" y="78"/>
+                  </a:cubicBezTo>
+                  <a:cubicBezTo>
+                    <a:pt x="93" y="77"/>
+                    <a:pt x="94" y="77"/>
+                    <a:pt x="94" y="77"/>
+                  </a:cubicBezTo>
+                  <a:cubicBezTo>
+                    <a:pt x="94" y="77"/>
+                    <a:pt x="94" y="77"/>
+                    <a:pt x="94" y="77"/>
+                  </a:cubicBezTo>
+                  <a:cubicBezTo>
+                    <a:pt x="94" y="77"/>
+                    <a:pt x="94" y="77"/>
+                    <a:pt x="94" y="77"/>
+                  </a:cubicBezTo>
+                  <a:cubicBezTo>
+                    <a:pt x="139" y="50"/>
+                    <a:pt x="139" y="50"/>
+                    <a:pt x="139" y="50"/>
+                  </a:cubicBezTo>
+                  <a:cubicBezTo>
+                    <a:pt x="140" y="49"/>
+                    <a:pt x="140" y="48"/>
+                    <a:pt x="140" y="47"/>
+                  </a:cubicBezTo>
+                  <a:cubicBezTo>
+                    <a:pt x="142" y="4"/>
+                    <a:pt x="142" y="4"/>
+                    <a:pt x="142" y="4"/>
+                  </a:cubicBezTo>
+                  <a:cubicBezTo>
+                    <a:pt x="142" y="3"/>
+                    <a:pt x="142" y="2"/>
+                    <a:pt x="141" y="1"/>
+                  </a:cubicBezTo>
+                  <a:cubicBezTo>
+                    <a:pt x="140" y="0"/>
+                    <a:pt x="139" y="0"/>
+                    <a:pt x="137" y="0"/>
+                  </a:cubicBezTo>
+                  <a:cubicBezTo>
+                    <a:pt x="112" y="6"/>
+                    <a:pt x="112" y="6"/>
+                    <a:pt x="112" y="6"/>
+                  </a:cubicBezTo>
+                  <a:cubicBezTo>
+                    <a:pt x="110" y="6"/>
+                    <a:pt x="110" y="6"/>
+                    <a:pt x="110" y="6"/>
+                  </a:cubicBezTo>
+                  <a:cubicBezTo>
+                    <a:pt x="110" y="6"/>
+                    <a:pt x="110" y="7"/>
+                    <a:pt x="110" y="7"/>
+                  </a:cubicBezTo>
+                  <a:cubicBezTo>
+                    <a:pt x="109" y="8"/>
+                    <a:pt x="109" y="9"/>
+                    <a:pt x="109" y="10"/>
+                  </a:cubicBezTo>
+                  <a:cubicBezTo>
+                    <a:pt x="108" y="13"/>
+                    <a:pt x="107" y="16"/>
+                    <a:pt x="106" y="18"/>
+                  </a:cubicBezTo>
+                  <a:cubicBezTo>
+                    <a:pt x="90" y="68"/>
+                    <a:pt x="90" y="68"/>
+                    <a:pt x="90" y="68"/>
+                  </a:cubicBezTo>
+                  <a:cubicBezTo>
+                    <a:pt x="54" y="46"/>
+                    <a:pt x="54" y="46"/>
+                    <a:pt x="54" y="46"/>
+                  </a:cubicBezTo>
+                  <a:cubicBezTo>
+                    <a:pt x="72" y="26"/>
+                    <a:pt x="72" y="26"/>
+                    <a:pt x="72" y="26"/>
+                  </a:cubicBezTo>
+                  <a:cubicBezTo>
+                    <a:pt x="71" y="23"/>
+                    <a:pt x="70" y="21"/>
+                    <a:pt x="69" y="18"/>
+                  </a:cubicBezTo>
+                  <a:cubicBezTo>
+                    <a:pt x="46" y="44"/>
+                    <a:pt x="46" y="44"/>
+                    <a:pt x="46" y="44"/>
+                  </a:cubicBezTo>
+                  <a:cubicBezTo>
+                    <a:pt x="25" y="56"/>
+                    <a:pt x="25" y="56"/>
+                    <a:pt x="25" y="56"/>
+                  </a:cubicBezTo>
+                  <a:cubicBezTo>
+                    <a:pt x="58" y="18"/>
+                    <a:pt x="58" y="18"/>
+                    <a:pt x="58" y="18"/>
+                  </a:cubicBezTo>
+                  <a:cubicBezTo>
+                    <a:pt x="68" y="15"/>
+                    <a:pt x="68" y="15"/>
+                    <a:pt x="68" y="15"/>
+                  </a:cubicBezTo>
+                  <a:cubicBezTo>
+                    <a:pt x="67" y="14"/>
+                    <a:pt x="67" y="12"/>
+                    <a:pt x="66" y="10"/>
+                  </a:cubicBezTo>
+                  <a:cubicBezTo>
+                    <a:pt x="66" y="9"/>
+                    <a:pt x="65" y="8"/>
+                    <a:pt x="65" y="8"/>
+                  </a:cubicBezTo>
+                  <a:cubicBezTo>
+                    <a:pt x="55" y="11"/>
+                    <a:pt x="55" y="11"/>
+                    <a:pt x="55" y="11"/>
+                  </a:cubicBezTo>
+                  <a:cubicBezTo>
+                    <a:pt x="54" y="11"/>
+                    <a:pt x="53" y="12"/>
+                    <a:pt x="53" y="12"/>
+                  </a:cubicBezTo>
+                  <a:cubicBezTo>
+                    <a:pt x="1" y="71"/>
+                    <a:pt x="1" y="71"/>
+                    <a:pt x="1" y="71"/>
+                  </a:cubicBezTo>
+                  <a:cubicBezTo>
+                    <a:pt x="0" y="72"/>
+                    <a:pt x="0" y="75"/>
+                    <a:pt x="1" y="76"/>
+                  </a:cubicBezTo>
+                  <a:cubicBezTo>
+                    <a:pt x="2" y="77"/>
+                    <a:pt x="3" y="78"/>
+                    <a:pt x="4" y="78"/>
+                  </a:cubicBezTo>
+                  <a:close/>
+                  <a:moveTo>
+                    <a:pt x="115" y="14"/>
+                  </a:moveTo>
+                  <a:cubicBezTo>
+                    <a:pt x="134" y="9"/>
+                    <a:pt x="134" y="9"/>
+                    <a:pt x="134" y="9"/>
+                  </a:cubicBezTo>
+                  <a:cubicBezTo>
+                    <a:pt x="133" y="44"/>
+                    <a:pt x="133" y="44"/>
+                    <a:pt x="133" y="44"/>
+                  </a:cubicBezTo>
+                  <a:cubicBezTo>
+                    <a:pt x="99" y="65"/>
+                    <a:pt x="99" y="65"/>
+                    <a:pt x="99" y="65"/>
+                  </a:cubicBezTo>
+                  <a:lnTo>
+                    <a:pt x="115" y="14"/>
+                  </a:lnTo>
+                  <a:close/>
+                </a:path>
+              </a:pathLst>
+            </a:custGeom>
+            <a:grpFill/>
+            <a:ln>
+              <a:noFill/>
+            </a:ln>
+            <a:extLst>
+              <a:ext uri="{91240B29-F687-4F45-9708-019B960494DF}">
+                <a14:hiddenLine xmlns:a14="http://schemas.microsoft.com/office/drawing/2010/main" w="9525">
+                  <a:solidFill>
+                    <a:srgbClr val="000000"/>
+                  </a:solidFill>
+                  <a:round/>
+                  <a:headEnd/>
+                  <a:tailEnd/>
+                </a14:hiddenLine>
+              </a:ext>
+            </a:extLst>
+          </p:spPr>
+          <p:txBody>
+            <a:bodyPr vert="horz" wrap="square" lIns="91440" tIns="45720" rIns="91440" bIns="45720" numCol="1" anchor="t" anchorCtr="0" compatLnSpc="1">
+              <a:prstTxWarp prst="textNoShape">
                 <a:avLst/>
-              </a:prstGeom>
-              <a:noFill/>
-            </p:spPr>
-            <p:txBody>
-              <a:bodyPr wrap="none" rtlCol="0">
-                <a:spAutoFit/>
-              </a:bodyPr>
-              <a:lstStyle/>
-              <a:p>
-                <a:r>
-                  <a:rPr lang="zh-CN" altLang="en-US" sz="700" dirty="0">
-                    <a:solidFill>
-                      <a:schemeClr val="bg1">
-                        <a:alpha val="40000"/>
-                      </a:schemeClr>
-                    </a:solidFill>
-                    <a:latin typeface="思源黑体 CN ExtraLight" panose="020B0200000000000000" pitchFamily="34" charset="-122"/>
-                    <a:ea typeface="思源黑体 CN ExtraLight" panose="020B0200000000000000" pitchFamily="34" charset="-122"/>
-                  </a:rPr>
-                  <a:t>埃律西昂火山</a:t>
-                </a:r>
-              </a:p>
-            </p:txBody>
-          </p:sp>
-        </p:grpSp>
-        <p:cxnSp>
-          <p:nvCxnSpPr>
-            <p:cNvPr id="1041" name="直接连接符 1040">
+              </a:prstTxWarp>
+            </a:bodyPr>
+            <a:lstStyle/>
+            <a:p>
+              <a:endParaRPr lang="zh-CN" altLang="en-US"/>
+            </a:p>
+          </p:txBody>
+        </p:sp>
+        <p:sp>
+          <p:nvSpPr>
+            <p:cNvPr id="283" name="Freeform 468">
               <a:extLst>
                 <a:ext uri="{FF2B5EF4-FFF2-40B4-BE49-F238E27FC236}">
-                  <a16:creationId xmlns:a16="http://schemas.microsoft.com/office/drawing/2014/main" id="{42F3866D-874E-409D-B6C6-A02BB8E6EA8A}"/>
+                  <a16:creationId xmlns:a16="http://schemas.microsoft.com/office/drawing/2014/main" id="{A071CE95-BAA2-4305-9203-292E61DE46A2}"/>
                 </a:ext>
               </a:extLst>
             </p:cNvPr>
-            <p:cNvCxnSpPr/>
+            <p:cNvSpPr>
+              <a:spLocks noEditPoints="1"/>
+            </p:cNvSpPr>
             <p:nvPr/>
-          </p:nvCxnSpPr>
-          <p:spPr>
+          </p:nvSpPr>
+          <p:spPr bwMode="auto">
             <a:xfrm>
-              <a:off x="126207" y="2278980"/>
-              <a:ext cx="0" cy="226983"/>
+              <a:off x="5429250" y="6027738"/>
+              <a:ext cx="173037" cy="295275"/>
             </a:xfrm>
-            <a:prstGeom prst="line">
+            <a:custGeom>
               <a:avLst/>
-            </a:prstGeom>
-            <a:ln w="6350">
-              <a:solidFill>
-                <a:schemeClr val="bg1">
-                  <a:alpha val="20000"/>
-                </a:schemeClr>
-              </a:solidFill>
+              <a:gdLst>
+                <a:gd name="T0" fmla="*/ 0 w 54"/>
+                <a:gd name="T1" fmla="*/ 27 h 92"/>
+                <a:gd name="T2" fmla="*/ 27 w 54"/>
+                <a:gd name="T3" fmla="*/ 92 h 92"/>
+                <a:gd name="T4" fmla="*/ 54 w 54"/>
+                <a:gd name="T5" fmla="*/ 27 h 92"/>
+                <a:gd name="T6" fmla="*/ 27 w 54"/>
+                <a:gd name="T7" fmla="*/ 0 h 92"/>
+                <a:gd name="T8" fmla="*/ 0 w 54"/>
+                <a:gd name="T9" fmla="*/ 27 h 92"/>
+                <a:gd name="T10" fmla="*/ 46 w 54"/>
+                <a:gd name="T11" fmla="*/ 27 h 92"/>
+                <a:gd name="T12" fmla="*/ 27 w 54"/>
+                <a:gd name="T13" fmla="*/ 83 h 92"/>
+                <a:gd name="T14" fmla="*/ 8 w 54"/>
+                <a:gd name="T15" fmla="*/ 27 h 92"/>
+                <a:gd name="T16" fmla="*/ 27 w 54"/>
+                <a:gd name="T17" fmla="*/ 8 h 92"/>
+                <a:gd name="T18" fmla="*/ 46 w 54"/>
+                <a:gd name="T19" fmla="*/ 27 h 92"/>
+              </a:gdLst>
+              <a:ahLst/>
+              <a:cxnLst>
+                <a:cxn ang="0">
+                  <a:pos x="T0" y="T1"/>
+                </a:cxn>
+                <a:cxn ang="0">
+                  <a:pos x="T2" y="T3"/>
+                </a:cxn>
+                <a:cxn ang="0">
+                  <a:pos x="T4" y="T5"/>
+                </a:cxn>
+                <a:cxn ang="0">
+                  <a:pos x="T6" y="T7"/>
+                </a:cxn>
+                <a:cxn ang="0">
+                  <a:pos x="T8" y="T9"/>
+                </a:cxn>
+                <a:cxn ang="0">
+                  <a:pos x="T10" y="T11"/>
+                </a:cxn>
+                <a:cxn ang="0">
+                  <a:pos x="T12" y="T13"/>
+                </a:cxn>
+                <a:cxn ang="0">
+                  <a:pos x="T14" y="T15"/>
+                </a:cxn>
+                <a:cxn ang="0">
+                  <a:pos x="T16" y="T17"/>
+                </a:cxn>
+                <a:cxn ang="0">
+                  <a:pos x="T18" y="T19"/>
+                </a:cxn>
+              </a:cxnLst>
+              <a:rect l="0" t="0" r="r" b="b"/>
+              <a:pathLst>
+                <a:path w="54" h="92">
+                  <a:moveTo>
+                    <a:pt x="0" y="27"/>
+                  </a:moveTo>
+                  <a:cubicBezTo>
+                    <a:pt x="0" y="37"/>
+                    <a:pt x="16" y="92"/>
+                    <a:pt x="27" y="92"/>
+                  </a:cubicBezTo>
+                  <a:cubicBezTo>
+                    <a:pt x="38" y="92"/>
+                    <a:pt x="54" y="37"/>
+                    <a:pt x="54" y="27"/>
+                  </a:cubicBezTo>
+                  <a:cubicBezTo>
+                    <a:pt x="54" y="12"/>
+                    <a:pt x="42" y="0"/>
+                    <a:pt x="27" y="0"/>
+                  </a:cubicBezTo>
+                  <a:cubicBezTo>
+                    <a:pt x="12" y="0"/>
+                    <a:pt x="0" y="12"/>
+                    <a:pt x="0" y="27"/>
+                  </a:cubicBezTo>
+                  <a:close/>
+                  <a:moveTo>
+                    <a:pt x="46" y="27"/>
+                  </a:moveTo>
+                  <a:cubicBezTo>
+                    <a:pt x="46" y="38"/>
+                    <a:pt x="33" y="75"/>
+                    <a:pt x="27" y="83"/>
+                  </a:cubicBezTo>
+                  <a:cubicBezTo>
+                    <a:pt x="21" y="75"/>
+                    <a:pt x="8" y="38"/>
+                    <a:pt x="8" y="27"/>
+                  </a:cubicBezTo>
+                  <a:cubicBezTo>
+                    <a:pt x="8" y="17"/>
+                    <a:pt x="17" y="8"/>
+                    <a:pt x="27" y="8"/>
+                  </a:cubicBezTo>
+                  <a:cubicBezTo>
+                    <a:pt x="38" y="8"/>
+                    <a:pt x="46" y="17"/>
+                    <a:pt x="46" y="27"/>
+                  </a:cubicBezTo>
+                  <a:close/>
+                </a:path>
+              </a:pathLst>
+            </a:custGeom>
+            <a:grpFill/>
+            <a:ln>
+              <a:noFill/>
             </a:ln>
+            <a:extLst>
+              <a:ext uri="{91240B29-F687-4F45-9708-019B960494DF}">
+                <a14:hiddenLine xmlns:a14="http://schemas.microsoft.com/office/drawing/2010/main" w="9525">
+                  <a:solidFill>
+                    <a:srgbClr val="000000"/>
+                  </a:solidFill>
+                  <a:round/>
+                  <a:headEnd/>
+                  <a:tailEnd/>
+                </a14:hiddenLine>
+              </a:ext>
+            </a:extLst>
           </p:spPr>
-          <p:style>
-            <a:lnRef idx="1">
-              <a:schemeClr val="accent1"/>
-            </a:lnRef>
-            <a:fillRef idx="0">
-              <a:schemeClr val="accent1"/>
-            </a:fillRef>
-            <a:effectRef idx="0">
-              <a:schemeClr val="accent1"/>
-            </a:effectRef>
-            <a:fontRef idx="minor">
-              <a:schemeClr val="tx1"/>
-            </a:fontRef>
-          </p:style>
-        </p:cxnSp>
-        <p:cxnSp>
-          <p:nvCxnSpPr>
-            <p:cNvPr id="303" name="直接连接符 302">
+          <p:txBody>
+            <a:bodyPr vert="horz" wrap="square" lIns="91440" tIns="45720" rIns="91440" bIns="45720" numCol="1" anchor="t" anchorCtr="0" compatLnSpc="1">
+              <a:prstTxWarp prst="textNoShape">
+                <a:avLst/>
+              </a:prstTxWarp>
+            </a:bodyPr>
+            <a:lstStyle/>
+            <a:p>
+              <a:endParaRPr lang="zh-CN" altLang="en-US"/>
+            </a:p>
+          </p:txBody>
+        </p:sp>
+        <p:sp>
+          <p:nvSpPr>
+            <p:cNvPr id="284" name="Freeform 469">
               <a:extLst>
                 <a:ext uri="{FF2B5EF4-FFF2-40B4-BE49-F238E27FC236}">
-                  <a16:creationId xmlns:a16="http://schemas.microsoft.com/office/drawing/2014/main" id="{B3A33825-D119-40EA-A63A-0652CE1C843B}"/>
+                  <a16:creationId xmlns:a16="http://schemas.microsoft.com/office/drawing/2014/main" id="{FE424C5F-4408-422A-8535-88D021C36F4C}"/>
                 </a:ext>
               </a:extLst>
             </p:cNvPr>
-            <p:cNvCxnSpPr>
-              <a:cxnSpLocks/>
-            </p:cNvCxnSpPr>
+            <p:cNvSpPr>
+              <a:spLocks noEditPoints="1"/>
+            </p:cNvSpPr>
             <p:nvPr/>
-          </p:nvCxnSpPr>
-          <p:spPr>
-            <a:xfrm flipH="1">
-              <a:off x="126207" y="2505963"/>
-              <a:ext cx="271328" cy="0"/>
+          </p:nvSpPr>
+          <p:spPr bwMode="auto">
+            <a:xfrm>
+              <a:off x="5475287" y="6072188"/>
+              <a:ext cx="85724" cy="84139"/>
             </a:xfrm>
-            <a:prstGeom prst="line">
+            <a:custGeom>
               <a:avLst/>
-            </a:prstGeom>
-            <a:ln w="6350">
-              <a:solidFill>
-                <a:schemeClr val="bg1">
-                  <a:alpha val="20000"/>
-                </a:schemeClr>
-              </a:solidFill>
+              <a:gdLst>
+                <a:gd name="T0" fmla="*/ 0 w 27"/>
+                <a:gd name="T1" fmla="*/ 13 h 26"/>
+                <a:gd name="T2" fmla="*/ 13 w 27"/>
+                <a:gd name="T3" fmla="*/ 26 h 26"/>
+                <a:gd name="T4" fmla="*/ 27 w 27"/>
+                <a:gd name="T5" fmla="*/ 13 h 26"/>
+                <a:gd name="T6" fmla="*/ 13 w 27"/>
+                <a:gd name="T7" fmla="*/ 0 h 26"/>
+                <a:gd name="T8" fmla="*/ 0 w 27"/>
+                <a:gd name="T9" fmla="*/ 13 h 26"/>
+                <a:gd name="T10" fmla="*/ 19 w 27"/>
+                <a:gd name="T11" fmla="*/ 13 h 26"/>
+                <a:gd name="T12" fmla="*/ 13 w 27"/>
+                <a:gd name="T13" fmla="*/ 18 h 26"/>
+                <a:gd name="T14" fmla="*/ 8 w 27"/>
+                <a:gd name="T15" fmla="*/ 13 h 26"/>
+                <a:gd name="T16" fmla="*/ 13 w 27"/>
+                <a:gd name="T17" fmla="*/ 8 h 26"/>
+                <a:gd name="T18" fmla="*/ 19 w 27"/>
+                <a:gd name="T19" fmla="*/ 13 h 26"/>
+              </a:gdLst>
+              <a:ahLst/>
+              <a:cxnLst>
+                <a:cxn ang="0">
+                  <a:pos x="T0" y="T1"/>
+                </a:cxn>
+                <a:cxn ang="0">
+                  <a:pos x="T2" y="T3"/>
+                </a:cxn>
+                <a:cxn ang="0">
+                  <a:pos x="T4" y="T5"/>
+                </a:cxn>
+                <a:cxn ang="0">
+                  <a:pos x="T6" y="T7"/>
+                </a:cxn>
+                <a:cxn ang="0">
+                  <a:pos x="T8" y="T9"/>
+                </a:cxn>
+                <a:cxn ang="0">
+                  <a:pos x="T10" y="T11"/>
+                </a:cxn>
+                <a:cxn ang="0">
+                  <a:pos x="T12" y="T13"/>
+                </a:cxn>
+                <a:cxn ang="0">
+                  <a:pos x="T14" y="T15"/>
+                </a:cxn>
+                <a:cxn ang="0">
+                  <a:pos x="T16" y="T17"/>
+                </a:cxn>
+                <a:cxn ang="0">
+                  <a:pos x="T18" y="T19"/>
+                </a:cxn>
+              </a:cxnLst>
+              <a:rect l="0" t="0" r="r" b="b"/>
+              <a:pathLst>
+                <a:path w="27" h="26">
+                  <a:moveTo>
+                    <a:pt x="0" y="13"/>
+                  </a:moveTo>
+                  <a:cubicBezTo>
+                    <a:pt x="0" y="20"/>
+                    <a:pt x="6" y="26"/>
+                    <a:pt x="13" y="26"/>
+                  </a:cubicBezTo>
+                  <a:cubicBezTo>
+                    <a:pt x="21" y="26"/>
+                    <a:pt x="27" y="20"/>
+                    <a:pt x="27" y="13"/>
+                  </a:cubicBezTo>
+                  <a:cubicBezTo>
+                    <a:pt x="27" y="6"/>
+                    <a:pt x="21" y="0"/>
+                    <a:pt x="13" y="0"/>
+                  </a:cubicBezTo>
+                  <a:cubicBezTo>
+                    <a:pt x="6" y="0"/>
+                    <a:pt x="0" y="6"/>
+                    <a:pt x="0" y="13"/>
+                  </a:cubicBezTo>
+                  <a:close/>
+                  <a:moveTo>
+                    <a:pt x="19" y="13"/>
+                  </a:moveTo>
+                  <a:cubicBezTo>
+                    <a:pt x="19" y="16"/>
+                    <a:pt x="16" y="18"/>
+                    <a:pt x="13" y="18"/>
+                  </a:cubicBezTo>
+                  <a:cubicBezTo>
+                    <a:pt x="10" y="18"/>
+                    <a:pt x="8" y="16"/>
+                    <a:pt x="8" y="13"/>
+                  </a:cubicBezTo>
+                  <a:cubicBezTo>
+                    <a:pt x="8" y="10"/>
+                    <a:pt x="10" y="8"/>
+                    <a:pt x="13" y="8"/>
+                  </a:cubicBezTo>
+                  <a:cubicBezTo>
+                    <a:pt x="16" y="8"/>
+                    <a:pt x="19" y="10"/>
+                    <a:pt x="19" y="13"/>
+                  </a:cubicBezTo>
+                  <a:close/>
+                </a:path>
+              </a:pathLst>
+            </a:custGeom>
+            <a:grpFill/>
+            <a:ln>
+              <a:noFill/>
             </a:ln>
+            <a:extLst>
+              <a:ext uri="{91240B29-F687-4F45-9708-019B960494DF}">
+                <a14:hiddenLine xmlns:a14="http://schemas.microsoft.com/office/drawing/2010/main" w="9525">
+                  <a:solidFill>
+                    <a:srgbClr val="000000"/>
+                  </a:solidFill>
+                  <a:round/>
+                  <a:headEnd/>
+                  <a:tailEnd/>
+                </a14:hiddenLine>
+              </a:ext>
+            </a:extLst>
           </p:spPr>
-          <p:style>
-            <a:lnRef idx="1">
-              <a:schemeClr val="accent1"/>
-            </a:lnRef>
-            <a:fillRef idx="0">
-              <a:schemeClr val="accent1"/>
-            </a:fillRef>
-            <a:effectRef idx="0">
-              <a:schemeClr val="accent1"/>
-            </a:effectRef>
-            <a:fontRef idx="minor">
-              <a:schemeClr val="tx1"/>
-            </a:fontRef>
-          </p:style>
-        </p:cxnSp>
+          <p:txBody>
+            <a:bodyPr vert="horz" wrap="square" lIns="91440" tIns="45720" rIns="91440" bIns="45720" numCol="1" anchor="t" anchorCtr="0" compatLnSpc="1">
+              <a:prstTxWarp prst="textNoShape">
+                <a:avLst/>
+              </a:prstTxWarp>
+            </a:bodyPr>
+            <a:lstStyle/>
+            <a:p>
+              <a:endParaRPr lang="zh-CN" altLang="en-US"/>
+            </a:p>
+          </p:txBody>
+        </p:sp>
       </p:grpSp>
+      <p:sp>
+        <p:nvSpPr>
+          <p:cNvPr id="1037" name="文本框 1036">
+            <a:extLst>
+              <a:ext uri="{FF2B5EF4-FFF2-40B4-BE49-F238E27FC236}">
+                <a16:creationId xmlns:a16="http://schemas.microsoft.com/office/drawing/2014/main" id="{218C670D-792C-406E-8E81-25A364226B91}"/>
+              </a:ext>
+            </a:extLst>
+          </p:cNvPr>
+          <p:cNvSpPr txBox="1"/>
+          <p:nvPr/>
+        </p:nvSpPr>
+        <p:spPr>
+          <a:xfrm>
+            <a:off x="473582" y="2406836"/>
+            <a:ext cx="723275" cy="200055"/>
+          </a:xfrm>
+          <a:prstGeom prst="rect">
+            <a:avLst/>
+          </a:prstGeom>
+          <a:noFill/>
+        </p:spPr>
+        <p:txBody>
+          <a:bodyPr wrap="none" rtlCol="0">
+            <a:spAutoFit/>
+          </a:bodyPr>
+          <a:lstStyle/>
+          <a:p>
+            <a:r>
+              <a:rPr lang="zh-CN" altLang="en-US" sz="700" dirty="0">
+                <a:solidFill>
+                  <a:schemeClr val="bg1">
+                    <a:alpha val="40000"/>
+                  </a:schemeClr>
+                </a:solidFill>
+                <a:latin typeface="思源黑体 CN ExtraLight" panose="020B0200000000000000" pitchFamily="34" charset="-122"/>
+                <a:ea typeface="思源黑体 CN ExtraLight" panose="020B0200000000000000" pitchFamily="34" charset="-122"/>
+              </a:rPr>
+              <a:t>埃律西昂火山</a:t>
+            </a:r>
+          </a:p>
+        </p:txBody>
+      </p:sp>
+      <p:cxnSp>
+        <p:nvCxnSpPr>
+          <p:cNvPr id="1041" name="直接连接符 1040">
+            <a:extLst>
+              <a:ext uri="{FF2B5EF4-FFF2-40B4-BE49-F238E27FC236}">
+                <a16:creationId xmlns:a16="http://schemas.microsoft.com/office/drawing/2014/main" id="{42F3866D-874E-409D-B6C6-A02BB8E6EA8A}"/>
+              </a:ext>
+            </a:extLst>
+          </p:cNvPr>
+          <p:cNvCxnSpPr/>
+          <p:nvPr/>
+        </p:nvCxnSpPr>
+        <p:spPr>
+          <a:xfrm>
+            <a:off x="126207" y="2278980"/>
+            <a:ext cx="0" cy="226983"/>
+          </a:xfrm>
+          <a:prstGeom prst="line">
+            <a:avLst/>
+          </a:prstGeom>
+          <a:ln w="6350">
+            <a:solidFill>
+              <a:schemeClr val="bg1">
+                <a:alpha val="20000"/>
+              </a:schemeClr>
+            </a:solidFill>
+          </a:ln>
+        </p:spPr>
+        <p:style>
+          <a:lnRef idx="1">
+            <a:schemeClr val="accent1"/>
+          </a:lnRef>
+          <a:fillRef idx="0">
+            <a:schemeClr val="accent1"/>
+          </a:fillRef>
+          <a:effectRef idx="0">
+            <a:schemeClr val="accent1"/>
+          </a:effectRef>
+          <a:fontRef idx="minor">
+            <a:schemeClr val="tx1"/>
+          </a:fontRef>
+        </p:style>
+      </p:cxnSp>
+      <p:cxnSp>
+        <p:nvCxnSpPr>
+          <p:cNvPr id="303" name="直接连接符 302">
+            <a:extLst>
+              <a:ext uri="{FF2B5EF4-FFF2-40B4-BE49-F238E27FC236}">
+                <a16:creationId xmlns:a16="http://schemas.microsoft.com/office/drawing/2014/main" id="{B3A33825-D119-40EA-A63A-0652CE1C843B}"/>
+              </a:ext>
+            </a:extLst>
+          </p:cNvPr>
+          <p:cNvCxnSpPr>
+            <a:cxnSpLocks/>
+          </p:cNvCxnSpPr>
+          <p:nvPr/>
+        </p:nvCxnSpPr>
+        <p:spPr>
+          <a:xfrm flipH="1">
+            <a:off x="126207" y="2505963"/>
+            <a:ext cx="271328" cy="0"/>
+          </a:xfrm>
+          <a:prstGeom prst="line">
+            <a:avLst/>
+          </a:prstGeom>
+          <a:ln w="6350">
+            <a:solidFill>
+              <a:schemeClr val="bg1">
+                <a:alpha val="20000"/>
+              </a:schemeClr>
+            </a:solidFill>
+          </a:ln>
+        </p:spPr>
+        <p:style>
+          <a:lnRef idx="1">
+            <a:schemeClr val="accent1"/>
+          </a:lnRef>
+          <a:fillRef idx="0">
+            <a:schemeClr val="accent1"/>
+          </a:fillRef>
+          <a:effectRef idx="0">
+            <a:schemeClr val="accent1"/>
+          </a:effectRef>
+          <a:fontRef idx="minor">
+            <a:schemeClr val="tx1"/>
+          </a:fontRef>
+        </p:style>
+      </p:cxnSp>
       <p:grpSp>
         <p:nvGrpSpPr>
           <p:cNvPr id="309" name="组合 308">

</xml_diff>